<commit_message>
Slides updated: top Rat, Ox, Monkey, Rooster
Good justification for why we use Chinese horoscope here
</commit_message>
<xml_diff>
--- a/Plan for Sunday.pptx
+++ b/Plan for Sunday.pptx
@@ -4,6 +4,9 @@
   <p:sldMasterIdLst>
     <p:sldMasterId id="2147483648" r:id="rId1"/>
   </p:sldMasterIdLst>
+  <p:notesMasterIdLst>
+    <p:notesMasterId r:id="rId16"/>
+  </p:notesMasterIdLst>
   <p:sldIdLst>
     <p:sldId id="256" r:id="rId2"/>
     <p:sldId id="258" r:id="rId3"/>
@@ -14,6 +17,11 @@
     <p:sldId id="260" r:id="rId8"/>
     <p:sldId id="263" r:id="rId9"/>
     <p:sldId id="264" r:id="rId10"/>
+    <p:sldId id="265" r:id="rId11"/>
+    <p:sldId id="266" r:id="rId12"/>
+    <p:sldId id="267" r:id="rId13"/>
+    <p:sldId id="269" r:id="rId14"/>
+    <p:sldId id="268" r:id="rId15"/>
   </p:sldIdLst>
   <p:sldSz cx="9144000" cy="6858000" type="screen4x3"/>
   <p:notesSz cx="6858000" cy="9144000"/>
@@ -115,6 +123,858 @@
 </p:presentation>
 </file>
 
+<file path=ppt/notesMasters/notesMaster1.xml><?xml version="1.0" encoding="utf-8"?>
+<p:notesMaster xmlns:a="http://schemas.openxmlformats.org/drawingml/2006/main" xmlns:r="http://schemas.openxmlformats.org/officeDocument/2006/relationships" xmlns:p="http://schemas.openxmlformats.org/presentationml/2006/main">
+  <p:cSld>
+    <p:bg>
+      <p:bgRef idx="1001">
+        <a:schemeClr val="bg1"/>
+      </p:bgRef>
+    </p:bg>
+    <p:spTree>
+      <p:nvGrpSpPr>
+        <p:cNvPr id="1" name=""/>
+        <p:cNvGrpSpPr/>
+        <p:nvPr/>
+      </p:nvGrpSpPr>
+      <p:grpSpPr>
+        <a:xfrm>
+          <a:off x="0" y="0"/>
+          <a:ext cx="0" cy="0"/>
+          <a:chOff x="0" y="0"/>
+          <a:chExt cx="0" cy="0"/>
+        </a:xfrm>
+      </p:grpSpPr>
+      <p:sp>
+        <p:nvSpPr>
+          <p:cNvPr id="2" name="Header Placeholder 1"/>
+          <p:cNvSpPr>
+            <a:spLocks noGrp="1"/>
+          </p:cNvSpPr>
+          <p:nvPr>
+            <p:ph type="hdr" sz="quarter"/>
+          </p:nvPr>
+        </p:nvSpPr>
+        <p:spPr>
+          <a:xfrm>
+            <a:off x="0" y="0"/>
+            <a:ext cx="2971800" cy="457200"/>
+          </a:xfrm>
+          <a:prstGeom prst="rect">
+            <a:avLst/>
+          </a:prstGeom>
+        </p:spPr>
+        <p:txBody>
+          <a:bodyPr vert="horz" lIns="91440" tIns="45720" rIns="91440" bIns="45720" rtlCol="0"/>
+          <a:lstStyle>
+            <a:lvl1pPr algn="l">
+              <a:defRPr sz="1200"/>
+            </a:lvl1pPr>
+          </a:lstStyle>
+          <a:p>
+            <a:endParaRPr lang="en-US"/>
+          </a:p>
+        </p:txBody>
+      </p:sp>
+      <p:sp>
+        <p:nvSpPr>
+          <p:cNvPr id="3" name="Date Placeholder 2"/>
+          <p:cNvSpPr>
+            <a:spLocks noGrp="1"/>
+          </p:cNvSpPr>
+          <p:nvPr>
+            <p:ph type="dt" idx="1"/>
+          </p:nvPr>
+        </p:nvSpPr>
+        <p:spPr>
+          <a:xfrm>
+            <a:off x="3884613" y="0"/>
+            <a:ext cx="2971800" cy="457200"/>
+          </a:xfrm>
+          <a:prstGeom prst="rect">
+            <a:avLst/>
+          </a:prstGeom>
+        </p:spPr>
+        <p:txBody>
+          <a:bodyPr vert="horz" lIns="91440" tIns="45720" rIns="91440" bIns="45720" rtlCol="0"/>
+          <a:lstStyle>
+            <a:lvl1pPr algn="r">
+              <a:defRPr sz="1200"/>
+            </a:lvl1pPr>
+          </a:lstStyle>
+          <a:p>
+            <a:fld id="{36C9A948-EB08-4586-8DB8-954A919AC783}" type="datetimeFigureOut">
+              <a:rPr lang="en-US" smtClean="0"/>
+              <a:t>11/15/2015</a:t>
+            </a:fld>
+            <a:endParaRPr lang="en-US"/>
+          </a:p>
+        </p:txBody>
+      </p:sp>
+      <p:sp>
+        <p:nvSpPr>
+          <p:cNvPr id="4" name="Slide Image Placeholder 3"/>
+          <p:cNvSpPr>
+            <a:spLocks noGrp="1" noRot="1" noChangeAspect="1"/>
+          </p:cNvSpPr>
+          <p:nvPr>
+            <p:ph type="sldImg" idx="2"/>
+          </p:nvPr>
+        </p:nvSpPr>
+        <p:spPr>
+          <a:xfrm>
+            <a:off x="1143000" y="685800"/>
+            <a:ext cx="4572000" cy="3429000"/>
+          </a:xfrm>
+          <a:prstGeom prst="rect">
+            <a:avLst/>
+          </a:prstGeom>
+          <a:noFill/>
+          <a:ln w="12700">
+            <a:solidFill>
+              <a:prstClr val="black"/>
+            </a:solidFill>
+          </a:ln>
+        </p:spPr>
+        <p:txBody>
+          <a:bodyPr vert="horz" lIns="91440" tIns="45720" rIns="91440" bIns="45720" rtlCol="0" anchor="ctr"/>
+          <a:lstStyle/>
+          <a:p>
+            <a:endParaRPr lang="en-US"/>
+          </a:p>
+        </p:txBody>
+      </p:sp>
+      <p:sp>
+        <p:nvSpPr>
+          <p:cNvPr id="5" name="Notes Placeholder 4"/>
+          <p:cNvSpPr>
+            <a:spLocks noGrp="1"/>
+          </p:cNvSpPr>
+          <p:nvPr>
+            <p:ph type="body" sz="quarter" idx="3"/>
+          </p:nvPr>
+        </p:nvSpPr>
+        <p:spPr>
+          <a:xfrm>
+            <a:off x="685800" y="4343400"/>
+            <a:ext cx="5486400" cy="4114800"/>
+          </a:xfrm>
+          <a:prstGeom prst="rect">
+            <a:avLst/>
+          </a:prstGeom>
+        </p:spPr>
+        <p:txBody>
+          <a:bodyPr vert="horz" lIns="91440" tIns="45720" rIns="91440" bIns="45720" rtlCol="0"/>
+          <a:lstStyle/>
+          <a:p>
+            <a:pPr lvl="0"/>
+            <a:r>
+              <a:rPr lang="en-US" smtClean="0"/>
+              <a:t>Click to edit Master text styles</a:t>
+            </a:r>
+          </a:p>
+          <a:p>
+            <a:pPr lvl="1"/>
+            <a:r>
+              <a:rPr lang="en-US" smtClean="0"/>
+              <a:t>Second level</a:t>
+            </a:r>
+          </a:p>
+          <a:p>
+            <a:pPr lvl="2"/>
+            <a:r>
+              <a:rPr lang="en-US" smtClean="0"/>
+              <a:t>Third level</a:t>
+            </a:r>
+          </a:p>
+          <a:p>
+            <a:pPr lvl="3"/>
+            <a:r>
+              <a:rPr lang="en-US" smtClean="0"/>
+              <a:t>Fourth level</a:t>
+            </a:r>
+          </a:p>
+          <a:p>
+            <a:pPr lvl="4"/>
+            <a:r>
+              <a:rPr lang="en-US" smtClean="0"/>
+              <a:t>Fifth level</a:t>
+            </a:r>
+            <a:endParaRPr lang="en-US"/>
+          </a:p>
+        </p:txBody>
+      </p:sp>
+      <p:sp>
+        <p:nvSpPr>
+          <p:cNvPr id="6" name="Footer Placeholder 5"/>
+          <p:cNvSpPr>
+            <a:spLocks noGrp="1"/>
+          </p:cNvSpPr>
+          <p:nvPr>
+            <p:ph type="ftr" sz="quarter" idx="4"/>
+          </p:nvPr>
+        </p:nvSpPr>
+        <p:spPr>
+          <a:xfrm>
+            <a:off x="0" y="8685213"/>
+            <a:ext cx="2971800" cy="457200"/>
+          </a:xfrm>
+          <a:prstGeom prst="rect">
+            <a:avLst/>
+          </a:prstGeom>
+        </p:spPr>
+        <p:txBody>
+          <a:bodyPr vert="horz" lIns="91440" tIns="45720" rIns="91440" bIns="45720" rtlCol="0" anchor="b"/>
+          <a:lstStyle>
+            <a:lvl1pPr algn="l">
+              <a:defRPr sz="1200"/>
+            </a:lvl1pPr>
+          </a:lstStyle>
+          <a:p>
+            <a:endParaRPr lang="en-US"/>
+          </a:p>
+        </p:txBody>
+      </p:sp>
+      <p:sp>
+        <p:nvSpPr>
+          <p:cNvPr id="7" name="Slide Number Placeholder 6"/>
+          <p:cNvSpPr>
+            <a:spLocks noGrp="1"/>
+          </p:cNvSpPr>
+          <p:nvPr>
+            <p:ph type="sldNum" sz="quarter" idx="5"/>
+          </p:nvPr>
+        </p:nvSpPr>
+        <p:spPr>
+          <a:xfrm>
+            <a:off x="3884613" y="8685213"/>
+            <a:ext cx="2971800" cy="457200"/>
+          </a:xfrm>
+          <a:prstGeom prst="rect">
+            <a:avLst/>
+          </a:prstGeom>
+        </p:spPr>
+        <p:txBody>
+          <a:bodyPr vert="horz" lIns="91440" tIns="45720" rIns="91440" bIns="45720" rtlCol="0" anchor="b"/>
+          <a:lstStyle>
+            <a:lvl1pPr algn="r">
+              <a:defRPr sz="1200"/>
+            </a:lvl1pPr>
+          </a:lstStyle>
+          <a:p>
+            <a:fld id="{CA67AC79-D99B-4887-B789-CF8AA93E91B8}" type="slidenum">
+              <a:rPr lang="en-US" smtClean="0"/>
+              <a:t>‹#›</a:t>
+            </a:fld>
+            <a:endParaRPr lang="en-US"/>
+          </a:p>
+        </p:txBody>
+      </p:sp>
+    </p:spTree>
+    <p:extLst>
+      <p:ext uri="{BB962C8B-B14F-4D97-AF65-F5344CB8AC3E}">
+        <p14:creationId xmlns:p14="http://schemas.microsoft.com/office/powerpoint/2010/main" val="2855760590"/>
+      </p:ext>
+    </p:extLst>
+  </p:cSld>
+  <p:clrMap bg1="lt1" tx1="dk1" bg2="lt2" tx2="dk2" accent1="accent1" accent2="accent2" accent3="accent3" accent4="accent4" accent5="accent5" accent6="accent6" hlink="hlink" folHlink="folHlink"/>
+  <p:notesStyle>
+    <a:lvl1pPr marL="0" algn="l" defTabSz="914400" rtl="0" eaLnBrk="1" latinLnBrk="0" hangingPunct="1">
+      <a:defRPr sz="1200" kern="1200">
+        <a:solidFill>
+          <a:schemeClr val="tx1"/>
+        </a:solidFill>
+        <a:latin typeface="+mn-lt"/>
+        <a:ea typeface="+mn-ea"/>
+        <a:cs typeface="+mn-cs"/>
+      </a:defRPr>
+    </a:lvl1pPr>
+    <a:lvl2pPr marL="457200" algn="l" defTabSz="914400" rtl="0" eaLnBrk="1" latinLnBrk="0" hangingPunct="1">
+      <a:defRPr sz="1200" kern="1200">
+        <a:solidFill>
+          <a:schemeClr val="tx1"/>
+        </a:solidFill>
+        <a:latin typeface="+mn-lt"/>
+        <a:ea typeface="+mn-ea"/>
+        <a:cs typeface="+mn-cs"/>
+      </a:defRPr>
+    </a:lvl2pPr>
+    <a:lvl3pPr marL="914400" algn="l" defTabSz="914400" rtl="0" eaLnBrk="1" latinLnBrk="0" hangingPunct="1">
+      <a:defRPr sz="1200" kern="1200">
+        <a:solidFill>
+          <a:schemeClr val="tx1"/>
+        </a:solidFill>
+        <a:latin typeface="+mn-lt"/>
+        <a:ea typeface="+mn-ea"/>
+        <a:cs typeface="+mn-cs"/>
+      </a:defRPr>
+    </a:lvl3pPr>
+    <a:lvl4pPr marL="1371600" algn="l" defTabSz="914400" rtl="0" eaLnBrk="1" latinLnBrk="0" hangingPunct="1">
+      <a:defRPr sz="1200" kern="1200">
+        <a:solidFill>
+          <a:schemeClr val="tx1"/>
+        </a:solidFill>
+        <a:latin typeface="+mn-lt"/>
+        <a:ea typeface="+mn-ea"/>
+        <a:cs typeface="+mn-cs"/>
+      </a:defRPr>
+    </a:lvl4pPr>
+    <a:lvl5pPr marL="1828800" algn="l" defTabSz="914400" rtl="0" eaLnBrk="1" latinLnBrk="0" hangingPunct="1">
+      <a:defRPr sz="1200" kern="1200">
+        <a:solidFill>
+          <a:schemeClr val="tx1"/>
+        </a:solidFill>
+        <a:latin typeface="+mn-lt"/>
+        <a:ea typeface="+mn-ea"/>
+        <a:cs typeface="+mn-cs"/>
+      </a:defRPr>
+    </a:lvl5pPr>
+    <a:lvl6pPr marL="2286000" algn="l" defTabSz="914400" rtl="0" eaLnBrk="1" latinLnBrk="0" hangingPunct="1">
+      <a:defRPr sz="1200" kern="1200">
+        <a:solidFill>
+          <a:schemeClr val="tx1"/>
+        </a:solidFill>
+        <a:latin typeface="+mn-lt"/>
+        <a:ea typeface="+mn-ea"/>
+        <a:cs typeface="+mn-cs"/>
+      </a:defRPr>
+    </a:lvl6pPr>
+    <a:lvl7pPr marL="2743200" algn="l" defTabSz="914400" rtl="0" eaLnBrk="1" latinLnBrk="0" hangingPunct="1">
+      <a:defRPr sz="1200" kern="1200">
+        <a:solidFill>
+          <a:schemeClr val="tx1"/>
+        </a:solidFill>
+        <a:latin typeface="+mn-lt"/>
+        <a:ea typeface="+mn-ea"/>
+        <a:cs typeface="+mn-cs"/>
+      </a:defRPr>
+    </a:lvl7pPr>
+    <a:lvl8pPr marL="3200400" algn="l" defTabSz="914400" rtl="0" eaLnBrk="1" latinLnBrk="0" hangingPunct="1">
+      <a:defRPr sz="1200" kern="1200">
+        <a:solidFill>
+          <a:schemeClr val="tx1"/>
+        </a:solidFill>
+        <a:latin typeface="+mn-lt"/>
+        <a:ea typeface="+mn-ea"/>
+        <a:cs typeface="+mn-cs"/>
+      </a:defRPr>
+    </a:lvl8pPr>
+    <a:lvl9pPr marL="3657600" algn="l" defTabSz="914400" rtl="0" eaLnBrk="1" latinLnBrk="0" hangingPunct="1">
+      <a:defRPr sz="1200" kern="1200">
+        <a:solidFill>
+          <a:schemeClr val="tx1"/>
+        </a:solidFill>
+        <a:latin typeface="+mn-lt"/>
+        <a:ea typeface="+mn-ea"/>
+        <a:cs typeface="+mn-cs"/>
+      </a:defRPr>
+    </a:lvl9pPr>
+  </p:notesStyle>
+</p:notesMaster>
+</file>
+
+<file path=ppt/notesSlides/notesSlide1.xml><?xml version="1.0" encoding="utf-8"?>
+<p:notes xmlns:a="http://schemas.openxmlformats.org/drawingml/2006/main" xmlns:r="http://schemas.openxmlformats.org/officeDocument/2006/relationships" xmlns:p="http://schemas.openxmlformats.org/presentationml/2006/main">
+  <p:cSld>
+    <p:spTree>
+      <p:nvGrpSpPr>
+        <p:cNvPr id="1" name=""/>
+        <p:cNvGrpSpPr/>
+        <p:nvPr/>
+      </p:nvGrpSpPr>
+      <p:grpSpPr>
+        <a:xfrm>
+          <a:off x="0" y="0"/>
+          <a:ext cx="0" cy="0"/>
+          <a:chOff x="0" y="0"/>
+          <a:chExt cx="0" cy="0"/>
+        </a:xfrm>
+      </p:grpSpPr>
+      <p:sp>
+        <p:nvSpPr>
+          <p:cNvPr id="2" name="Slide Image Placeholder 1"/>
+          <p:cNvSpPr>
+            <a:spLocks noGrp="1" noRot="1" noChangeAspect="1"/>
+          </p:cNvSpPr>
+          <p:nvPr>
+            <p:ph type="sldImg"/>
+          </p:nvPr>
+        </p:nvSpPr>
+        <p:spPr/>
+      </p:sp>
+      <p:sp>
+        <p:nvSpPr>
+          <p:cNvPr id="3" name="Notes Placeholder 2"/>
+          <p:cNvSpPr>
+            <a:spLocks noGrp="1"/>
+          </p:cNvSpPr>
+          <p:nvPr>
+            <p:ph type="body" idx="1"/>
+          </p:nvPr>
+        </p:nvSpPr>
+        <p:spPr/>
+        <p:txBody>
+          <a:bodyPr/>
+          <a:lstStyle/>
+          <a:p>
+            <a:endParaRPr lang="en-US" dirty="0"/>
+          </a:p>
+        </p:txBody>
+      </p:sp>
+      <p:sp>
+        <p:nvSpPr>
+          <p:cNvPr id="4" name="Slide Number Placeholder 3"/>
+          <p:cNvSpPr>
+            <a:spLocks noGrp="1"/>
+          </p:cNvSpPr>
+          <p:nvPr>
+            <p:ph type="sldNum" sz="quarter" idx="10"/>
+          </p:nvPr>
+        </p:nvSpPr>
+        <p:spPr/>
+        <p:txBody>
+          <a:bodyPr/>
+          <a:lstStyle/>
+          <a:p>
+            <a:fld id="{CA67AC79-D99B-4887-B789-CF8AA93E91B8}" type="slidenum">
+              <a:rPr lang="en-US" smtClean="0"/>
+              <a:t>10</a:t>
+            </a:fld>
+            <a:endParaRPr lang="en-US"/>
+          </a:p>
+        </p:txBody>
+      </p:sp>
+    </p:spTree>
+    <p:extLst>
+      <p:ext uri="{BB962C8B-B14F-4D97-AF65-F5344CB8AC3E}">
+        <p14:creationId xmlns:p14="http://schemas.microsoft.com/office/powerpoint/2010/main" val="3556211971"/>
+      </p:ext>
+    </p:extLst>
+  </p:cSld>
+  <p:clrMapOvr>
+    <a:masterClrMapping/>
+  </p:clrMapOvr>
+</p:notes>
+</file>
+
+<file path=ppt/notesSlides/notesSlide2.xml><?xml version="1.0" encoding="utf-8"?>
+<p:notes xmlns:a="http://schemas.openxmlformats.org/drawingml/2006/main" xmlns:r="http://schemas.openxmlformats.org/officeDocument/2006/relationships" xmlns:p="http://schemas.openxmlformats.org/presentationml/2006/main">
+  <p:cSld>
+    <p:spTree>
+      <p:nvGrpSpPr>
+        <p:cNvPr id="1" name=""/>
+        <p:cNvGrpSpPr/>
+        <p:nvPr/>
+      </p:nvGrpSpPr>
+      <p:grpSpPr>
+        <a:xfrm>
+          <a:off x="0" y="0"/>
+          <a:ext cx="0" cy="0"/>
+          <a:chOff x="0" y="0"/>
+          <a:chExt cx="0" cy="0"/>
+        </a:xfrm>
+      </p:grpSpPr>
+      <p:sp>
+        <p:nvSpPr>
+          <p:cNvPr id="2" name="Slide Image Placeholder 1"/>
+          <p:cNvSpPr>
+            <a:spLocks noGrp="1" noRot="1" noChangeAspect="1"/>
+          </p:cNvSpPr>
+          <p:nvPr>
+            <p:ph type="sldImg"/>
+          </p:nvPr>
+        </p:nvSpPr>
+        <p:spPr/>
+      </p:sp>
+      <p:sp>
+        <p:nvSpPr>
+          <p:cNvPr id="3" name="Notes Placeholder 2"/>
+          <p:cNvSpPr>
+            <a:spLocks noGrp="1"/>
+          </p:cNvSpPr>
+          <p:nvPr>
+            <p:ph type="body" idx="1"/>
+          </p:nvPr>
+        </p:nvSpPr>
+        <p:spPr/>
+        <p:txBody>
+          <a:bodyPr/>
+          <a:lstStyle/>
+          <a:p>
+            <a:r>
+              <a:rPr lang="en-US" dirty="0" smtClean="0"/>
+              <a:t>Duane </a:t>
+            </a:r>
+            <a:r>
+              <a:rPr lang="en-US" dirty="0" err="1" smtClean="0"/>
+              <a:t>Michals</a:t>
+            </a:r>
+            <a:r>
+              <a:rPr lang="en-US" baseline="0" dirty="0" smtClean="0"/>
+              <a:t> </a:t>
+            </a:r>
+            <a:r>
+              <a:rPr lang="en-US" baseline="0" dirty="0" err="1" smtClean="0"/>
+              <a:t>McKeessport</a:t>
+            </a:r>
+            <a:r>
+              <a:rPr lang="en-US" baseline="0" dirty="0" smtClean="0"/>
+              <a:t> </a:t>
+            </a:r>
+            <a:r>
+              <a:rPr lang="en-US" sz="1200" b="0" kern="1200" dirty="0" smtClean="0">
+                <a:solidFill>
+                  <a:schemeClr val="tx1"/>
+                </a:solidFill>
+                <a:effectLst/>
+                <a:latin typeface="+mn-lt"/>
+                <a:ea typeface="+mn-ea"/>
+                <a:cs typeface="+mn-cs"/>
+              </a:rPr>
+              <a:t>one of the great photographic innovators of the last </a:t>
+            </a:r>
+            <a:r>
+              <a:rPr lang="en-US" sz="1200" b="0" kern="1200" dirty="0" err="1" smtClean="0">
+                <a:solidFill>
+                  <a:schemeClr val="tx1"/>
+                </a:solidFill>
+                <a:effectLst/>
+                <a:latin typeface="+mn-lt"/>
+                <a:ea typeface="+mn-ea"/>
+                <a:cs typeface="+mn-cs"/>
+              </a:rPr>
+              <a:t>century..Above</a:t>
+            </a:r>
+            <a:r>
+              <a:rPr lang="en-US" sz="1200" b="0" kern="1200" baseline="0" dirty="0" smtClean="0">
+                <a:solidFill>
+                  <a:schemeClr val="tx1"/>
+                </a:solidFill>
+                <a:effectLst/>
+                <a:latin typeface="+mn-lt"/>
+                <a:ea typeface="+mn-ea"/>
+                <a:cs typeface="+mn-cs"/>
+              </a:rPr>
+              <a:t> is Grandpa Goes To Heaven </a:t>
+            </a:r>
+            <a:endParaRPr lang="en-US" dirty="0" smtClean="0"/>
+          </a:p>
+          <a:p>
+            <a:endParaRPr lang="en-US" dirty="0" smtClean="0"/>
+          </a:p>
+          <a:p>
+            <a:r>
+              <a:rPr lang="en-US" dirty="0" smtClean="0"/>
+              <a:t>Actual</a:t>
+            </a:r>
+            <a:r>
+              <a:rPr lang="en-US" baseline="0" dirty="0" smtClean="0"/>
+              <a:t> top artist </a:t>
+            </a:r>
+            <a:r>
+              <a:rPr lang="en-US" baseline="0" dirty="0" err="1" smtClean="0"/>
+              <a:t>samuel</a:t>
+            </a:r>
+            <a:r>
+              <a:rPr lang="en-US" baseline="0" dirty="0" smtClean="0"/>
+              <a:t> Rosenberg (Pittsburgh)</a:t>
+            </a:r>
+            <a:r>
+              <a:rPr lang="en-US" dirty="0" smtClean="0"/>
+              <a:t> (1896-1972)</a:t>
+            </a:r>
+          </a:p>
+          <a:p>
+            <a:r>
+              <a:rPr lang="en-US" dirty="0" smtClean="0"/>
+              <a:t>Duane </a:t>
+            </a:r>
+            <a:r>
+              <a:rPr lang="en-US" dirty="0" err="1" smtClean="0"/>
+              <a:t>Michals</a:t>
+            </a:r>
+            <a:r>
+              <a:rPr lang="en-US" baseline="0" dirty="0" smtClean="0"/>
+              <a:t> , very </a:t>
+            </a:r>
+            <a:r>
+              <a:rPr lang="en-US" baseline="0" dirty="0" err="1" smtClean="0"/>
+              <a:t>mischevious</a:t>
+            </a:r>
+            <a:r>
+              <a:rPr lang="en-US" baseline="0" dirty="0" smtClean="0"/>
+              <a:t>, this series is called </a:t>
+            </a:r>
+          </a:p>
+          <a:p>
+            <a:pPr marL="0" marR="0" indent="0" algn="l" defTabSz="914400" rtl="0" eaLnBrk="1" fontAlgn="auto" latinLnBrk="0" hangingPunct="1">
+              <a:lnSpc>
+                <a:spcPct val="100000"/>
+              </a:lnSpc>
+              <a:spcBef>
+                <a:spcPts val="0"/>
+              </a:spcBef>
+              <a:spcAft>
+                <a:spcPts val="0"/>
+              </a:spcAft>
+              <a:buClrTx/>
+              <a:buSzTx/>
+              <a:buFontTx/>
+              <a:buNone/>
+              <a:tabLst/>
+              <a:defRPr/>
+            </a:pPr>
+            <a:r>
+              <a:rPr lang="en-US" dirty="0" smtClean="0">
+                <a:effectLst/>
+              </a:rPr>
+              <a:t>He describes his photographic skills as "completely self-taught”</a:t>
+            </a:r>
+            <a:r>
+              <a:rPr lang="en-US" baseline="0" dirty="0" smtClean="0">
+                <a:effectLst/>
+              </a:rPr>
+              <a:t> </a:t>
+            </a:r>
+            <a:r>
+              <a:rPr lang="en-US" dirty="0" smtClean="0">
+                <a:effectLst/>
+              </a:rPr>
+              <a:t>After two years in the Army, in 1956 he went on to study at the </a:t>
+            </a:r>
+            <a:r>
+              <a:rPr lang="en-US" dirty="0" smtClean="0">
+                <a:effectLst/>
+                <a:hlinkClick r:id="rId3" tooltip="Parsons School of Design"/>
+              </a:rPr>
+              <a:t>Parsons School of Design</a:t>
+            </a:r>
+            <a:r>
+              <a:rPr lang="en-US" dirty="0" smtClean="0">
+                <a:effectLst/>
+              </a:rPr>
+              <a:t> with a plan to become a graphic designer; however, he did not complete his studies.</a:t>
+            </a:r>
+            <a:r>
+              <a:rPr lang="en-US" b="0" i="0" baseline="30000" dirty="0" smtClean="0">
+                <a:effectLst/>
+                <a:hlinkClick r:id="rId4"/>
+              </a:rPr>
+              <a:t>[3]</a:t>
+            </a:r>
+            <a:endParaRPr lang="en-US" dirty="0" smtClean="0">
+              <a:effectLst/>
+            </a:endParaRPr>
+          </a:p>
+          <a:p>
+            <a:endParaRPr lang="en-US" baseline="0" dirty="0" smtClean="0"/>
+          </a:p>
+          <a:p>
+            <a:r>
+              <a:rPr lang="en-US" dirty="0" err="1" smtClean="0">
+                <a:effectLst/>
+              </a:rPr>
+              <a:t>Michals's</a:t>
+            </a:r>
+            <a:r>
+              <a:rPr lang="en-US" dirty="0" smtClean="0">
+                <a:effectLst/>
+              </a:rPr>
+              <a:t> work makes innovative use of photo-sequences, often incorporating text to examine emotion and philosophy</a:t>
+            </a:r>
+            <a:endParaRPr lang="en-US" dirty="0"/>
+          </a:p>
+        </p:txBody>
+      </p:sp>
+      <p:sp>
+        <p:nvSpPr>
+          <p:cNvPr id="4" name="Slide Number Placeholder 3"/>
+          <p:cNvSpPr>
+            <a:spLocks noGrp="1"/>
+          </p:cNvSpPr>
+          <p:nvPr>
+            <p:ph type="sldNum" sz="quarter" idx="10"/>
+          </p:nvPr>
+        </p:nvSpPr>
+        <p:spPr/>
+        <p:txBody>
+          <a:bodyPr/>
+          <a:lstStyle/>
+          <a:p>
+            <a:fld id="{CA67AC79-D99B-4887-B789-CF8AA93E91B8}" type="slidenum">
+              <a:rPr lang="en-US" smtClean="0"/>
+              <a:t>12</a:t>
+            </a:fld>
+            <a:endParaRPr lang="en-US"/>
+          </a:p>
+        </p:txBody>
+      </p:sp>
+    </p:spTree>
+    <p:extLst>
+      <p:ext uri="{BB962C8B-B14F-4D97-AF65-F5344CB8AC3E}">
+        <p14:creationId xmlns:p14="http://schemas.microsoft.com/office/powerpoint/2010/main" val="2532658702"/>
+      </p:ext>
+    </p:extLst>
+  </p:cSld>
+  <p:clrMapOvr>
+    <a:masterClrMapping/>
+  </p:clrMapOvr>
+</p:notes>
+</file>
+
+<file path=ppt/notesSlides/notesSlide3.xml><?xml version="1.0" encoding="utf-8"?>
+<p:notes xmlns:a="http://schemas.openxmlformats.org/drawingml/2006/main" xmlns:r="http://schemas.openxmlformats.org/officeDocument/2006/relationships" xmlns:p="http://schemas.openxmlformats.org/presentationml/2006/main">
+  <p:cSld>
+    <p:spTree>
+      <p:nvGrpSpPr>
+        <p:cNvPr id="1" name=""/>
+        <p:cNvGrpSpPr/>
+        <p:nvPr/>
+      </p:nvGrpSpPr>
+      <p:grpSpPr>
+        <a:xfrm>
+          <a:off x="0" y="0"/>
+          <a:ext cx="0" cy="0"/>
+          <a:chOff x="0" y="0"/>
+          <a:chExt cx="0" cy="0"/>
+        </a:xfrm>
+      </p:grpSpPr>
+      <p:sp>
+        <p:nvSpPr>
+          <p:cNvPr id="2" name="Slide Image Placeholder 1"/>
+          <p:cNvSpPr>
+            <a:spLocks noGrp="1" noRot="1" noChangeAspect="1"/>
+          </p:cNvSpPr>
+          <p:nvPr>
+            <p:ph type="sldImg"/>
+          </p:nvPr>
+        </p:nvSpPr>
+        <p:spPr/>
+      </p:sp>
+      <p:sp>
+        <p:nvSpPr>
+          <p:cNvPr id="3" name="Notes Placeholder 2"/>
+          <p:cNvSpPr>
+            <a:spLocks noGrp="1"/>
+          </p:cNvSpPr>
+          <p:nvPr>
+            <p:ph type="body" idx="1"/>
+          </p:nvPr>
+        </p:nvSpPr>
+        <p:spPr/>
+        <p:txBody>
+          <a:bodyPr/>
+          <a:lstStyle/>
+          <a:p>
+            <a:r>
+              <a:rPr lang="en-US" sz="1200" b="0" kern="1200" dirty="0" smtClean="0">
+                <a:solidFill>
+                  <a:schemeClr val="tx1"/>
+                </a:solidFill>
+                <a:effectLst/>
+                <a:latin typeface="+mn-lt"/>
+                <a:ea typeface="+mn-ea"/>
+                <a:cs typeface="+mn-cs"/>
+              </a:rPr>
+              <a:t>Muralist George Biddle social realism and combat art.</a:t>
+            </a:r>
+          </a:p>
+          <a:p>
+            <a:r>
+              <a:rPr lang="en-US" dirty="0" smtClean="0">
+                <a:effectLst/>
+              </a:rPr>
+              <a:t>A childhood friend of President </a:t>
+            </a:r>
+            <a:r>
+              <a:rPr lang="en-US" dirty="0" smtClean="0">
+                <a:effectLst/>
+                <a:hlinkClick r:id="rId3" tooltip="Franklin D. Roosevelt"/>
+              </a:rPr>
+              <a:t>Franklin D. Roosevelt</a:t>
+            </a:r>
+            <a:r>
+              <a:rPr lang="en-US" dirty="0" smtClean="0">
+                <a:effectLst/>
+              </a:rPr>
+              <a:t>, he played a major role in establishing the </a:t>
+            </a:r>
+            <a:r>
+              <a:rPr lang="en-US" dirty="0" smtClean="0">
+                <a:effectLst/>
+                <a:hlinkClick r:id="rId4" tooltip="Federal Art Project"/>
+              </a:rPr>
+              <a:t>Federal Art Project</a:t>
+            </a:r>
+            <a:r>
+              <a:rPr lang="en-US" dirty="0" smtClean="0">
+                <a:effectLst/>
+              </a:rPr>
+              <a:t> (1935-43), which employed artists under the </a:t>
+            </a:r>
+            <a:r>
+              <a:rPr lang="en-US" dirty="0" smtClean="0">
+                <a:effectLst/>
+                <a:hlinkClick r:id="rId5" tooltip="Works Progress Administration"/>
+              </a:rPr>
+              <a:t>Works Progress Administration</a:t>
+            </a:r>
+            <a:r>
+              <a:rPr lang="en-US" dirty="0" smtClean="0">
+                <a:effectLst/>
+              </a:rPr>
+              <a:t>.</a:t>
+            </a:r>
+          </a:p>
+          <a:p>
+            <a:r>
+              <a:rPr lang="en-US" dirty="0" smtClean="0">
+                <a:effectLst/>
+              </a:rPr>
+              <a:t>Here he is wearing a tie. </a:t>
+            </a:r>
+          </a:p>
+          <a:p>
+            <a:endParaRPr lang="en-US" dirty="0"/>
+          </a:p>
+        </p:txBody>
+      </p:sp>
+      <p:sp>
+        <p:nvSpPr>
+          <p:cNvPr id="4" name="Slide Number Placeholder 3"/>
+          <p:cNvSpPr>
+            <a:spLocks noGrp="1"/>
+          </p:cNvSpPr>
+          <p:nvPr>
+            <p:ph type="sldNum" sz="quarter" idx="10"/>
+          </p:nvPr>
+        </p:nvSpPr>
+        <p:spPr/>
+        <p:txBody>
+          <a:bodyPr/>
+          <a:lstStyle/>
+          <a:p>
+            <a:fld id="{CA67AC79-D99B-4887-B789-CF8AA93E91B8}" type="slidenum">
+              <a:rPr lang="en-US" smtClean="0"/>
+              <a:t>14</a:t>
+            </a:fld>
+            <a:endParaRPr lang="en-US"/>
+          </a:p>
+        </p:txBody>
+      </p:sp>
+    </p:spTree>
+    <p:extLst>
+      <p:ext uri="{BB962C8B-B14F-4D97-AF65-F5344CB8AC3E}">
+        <p14:creationId xmlns:p14="http://schemas.microsoft.com/office/powerpoint/2010/main" val="2532658702"/>
+      </p:ext>
+    </p:extLst>
+  </p:cSld>
+  <p:clrMapOvr>
+    <a:masterClrMapping/>
+  </p:clrMapOvr>
+</p:notes>
+</file>
+
 <file path=ppt/slideLayouts/slideLayout1.xml><?xml version="1.0" encoding="utf-8"?>
 <p:sldLayout xmlns:a="http://schemas.openxmlformats.org/drawingml/2006/main" xmlns:r="http://schemas.openxmlformats.org/officeDocument/2006/relationships" xmlns:p="http://schemas.openxmlformats.org/presentationml/2006/main" type="title" preserve="1">
   <p:cSld name="Title Slide">
@@ -296,7 +1156,7 @@
           <a:p>
             <a:fld id="{DA0EB263-8972-47CD-9DB7-7FAC90518991}" type="datetimeFigureOut">
               <a:rPr lang="en-US" smtClean="0"/>
-              <a:t>11/14/2015</a:t>
+              <a:t>11/15/2015</a:t>
             </a:fld>
             <a:endParaRPr lang="en-US"/>
           </a:p>
@@ -466,7 +1326,7 @@
           <a:p>
             <a:fld id="{DA0EB263-8972-47CD-9DB7-7FAC90518991}" type="datetimeFigureOut">
               <a:rPr lang="en-US" smtClean="0"/>
-              <a:t>11/14/2015</a:t>
+              <a:t>11/15/2015</a:t>
             </a:fld>
             <a:endParaRPr lang="en-US"/>
           </a:p>
@@ -646,7 +1506,7 @@
           <a:p>
             <a:fld id="{DA0EB263-8972-47CD-9DB7-7FAC90518991}" type="datetimeFigureOut">
               <a:rPr lang="en-US" smtClean="0"/>
-              <a:t>11/14/2015</a:t>
+              <a:t>11/15/2015</a:t>
             </a:fld>
             <a:endParaRPr lang="en-US"/>
           </a:p>
@@ -816,7 +1676,7 @@
           <a:p>
             <a:fld id="{DA0EB263-8972-47CD-9DB7-7FAC90518991}" type="datetimeFigureOut">
               <a:rPr lang="en-US" smtClean="0"/>
-              <a:t>11/14/2015</a:t>
+              <a:t>11/15/2015</a:t>
             </a:fld>
             <a:endParaRPr lang="en-US"/>
           </a:p>
@@ -1062,7 +1922,7 @@
           <a:p>
             <a:fld id="{DA0EB263-8972-47CD-9DB7-7FAC90518991}" type="datetimeFigureOut">
               <a:rPr lang="en-US" smtClean="0"/>
-              <a:t>11/14/2015</a:t>
+              <a:t>11/15/2015</a:t>
             </a:fld>
             <a:endParaRPr lang="en-US"/>
           </a:p>
@@ -1350,7 +2210,7 @@
           <a:p>
             <a:fld id="{DA0EB263-8972-47CD-9DB7-7FAC90518991}" type="datetimeFigureOut">
               <a:rPr lang="en-US" smtClean="0"/>
-              <a:t>11/14/2015</a:t>
+              <a:t>11/15/2015</a:t>
             </a:fld>
             <a:endParaRPr lang="en-US"/>
           </a:p>
@@ -1772,7 +2632,7 @@
           <a:p>
             <a:fld id="{DA0EB263-8972-47CD-9DB7-7FAC90518991}" type="datetimeFigureOut">
               <a:rPr lang="en-US" smtClean="0"/>
-              <a:t>11/14/2015</a:t>
+              <a:t>11/15/2015</a:t>
             </a:fld>
             <a:endParaRPr lang="en-US"/>
           </a:p>
@@ -1890,7 +2750,7 @@
           <a:p>
             <a:fld id="{DA0EB263-8972-47CD-9DB7-7FAC90518991}" type="datetimeFigureOut">
               <a:rPr lang="en-US" smtClean="0"/>
-              <a:t>11/14/2015</a:t>
+              <a:t>11/15/2015</a:t>
             </a:fld>
             <a:endParaRPr lang="en-US"/>
           </a:p>
@@ -1985,7 +2845,7 @@
           <a:p>
             <a:fld id="{DA0EB263-8972-47CD-9DB7-7FAC90518991}" type="datetimeFigureOut">
               <a:rPr lang="en-US" smtClean="0"/>
-              <a:t>11/14/2015</a:t>
+              <a:t>11/15/2015</a:t>
             </a:fld>
             <a:endParaRPr lang="en-US"/>
           </a:p>
@@ -2262,7 +3122,7 @@
           <a:p>
             <a:fld id="{DA0EB263-8972-47CD-9DB7-7FAC90518991}" type="datetimeFigureOut">
               <a:rPr lang="en-US" smtClean="0"/>
-              <a:t>11/14/2015</a:t>
+              <a:t>11/15/2015</a:t>
             </a:fld>
             <a:endParaRPr lang="en-US"/>
           </a:p>
@@ -2515,7 +3375,7 @@
           <a:p>
             <a:fld id="{DA0EB263-8972-47CD-9DB7-7FAC90518991}" type="datetimeFigureOut">
               <a:rPr lang="en-US" smtClean="0"/>
-              <a:t>11/14/2015</a:t>
+              <a:t>11/15/2015</a:t>
             </a:fld>
             <a:endParaRPr lang="en-US"/>
           </a:p>
@@ -2728,7 +3588,7 @@
           <a:p>
             <a:fld id="{DA0EB263-8972-47CD-9DB7-7FAC90518991}" type="datetimeFigureOut">
               <a:rPr lang="en-US" smtClean="0"/>
-              <a:t>11/14/2015</a:t>
+              <a:t>11/15/2015</a:t>
             </a:fld>
             <a:endParaRPr lang="en-US"/>
           </a:p>
@@ -3162,6 +4022,1272 @@
 </p:sld>
 </file>
 
+<file path=ppt/slides/slide10.xml><?xml version="1.0" encoding="utf-8"?>
+<p:sld xmlns:a="http://schemas.openxmlformats.org/drawingml/2006/main" xmlns:r="http://schemas.openxmlformats.org/officeDocument/2006/relationships" xmlns:p="http://schemas.openxmlformats.org/presentationml/2006/main">
+  <p:cSld>
+    <p:spTree>
+      <p:nvGrpSpPr>
+        <p:cNvPr id="1" name=""/>
+        <p:cNvGrpSpPr/>
+        <p:nvPr/>
+      </p:nvGrpSpPr>
+      <p:grpSpPr>
+        <a:xfrm>
+          <a:off x="0" y="0"/>
+          <a:ext cx="0" cy="0"/>
+          <a:chOff x="0" y="0"/>
+          <a:chExt cx="0" cy="0"/>
+        </a:xfrm>
+      </p:grpSpPr>
+      <p:sp>
+        <p:nvSpPr>
+          <p:cNvPr id="2" name="Title 1"/>
+          <p:cNvSpPr>
+            <a:spLocks noGrp="1"/>
+          </p:cNvSpPr>
+          <p:nvPr>
+            <p:ph type="title"/>
+          </p:nvPr>
+        </p:nvSpPr>
+        <p:spPr/>
+        <p:txBody>
+          <a:bodyPr>
+            <a:normAutofit fontScale="90000"/>
+          </a:bodyPr>
+          <a:lstStyle/>
+          <a:p>
+            <a:r>
+              <a:rPr lang="en-US" dirty="0" smtClean="0"/>
+              <a:t>Top CMOA Year of the Rat artist:</a:t>
+            </a:r>
+            <a:br>
+              <a:rPr lang="en-US" dirty="0" smtClean="0"/>
+            </a:br>
+            <a:r>
+              <a:rPr lang="en-US" dirty="0" smtClean="0"/>
+              <a:t> Josef Albers (1888-1976)</a:t>
+            </a:r>
+            <a:endParaRPr lang="en-US" dirty="0"/>
+          </a:p>
+        </p:txBody>
+      </p:sp>
+      <p:sp>
+        <p:nvSpPr>
+          <p:cNvPr id="4" name="AutoShape 2" descr="Image result for Josef Albers"/>
+          <p:cNvSpPr>
+            <a:spLocks noChangeAspect="1" noChangeArrowheads="1"/>
+          </p:cNvSpPr>
+          <p:nvPr/>
+        </p:nvSpPr>
+        <p:spPr bwMode="auto">
+          <a:xfrm>
+            <a:off x="0" y="-144463"/>
+            <a:ext cx="304800" cy="304801"/>
+          </a:xfrm>
+          <a:prstGeom prst="rect">
+            <a:avLst/>
+          </a:prstGeom>
+          <a:noFill/>
+          <a:extLst>
+            <a:ext uri="{909E8E84-426E-40DD-AFC4-6F175D3DCCD1}">
+              <a14:hiddenFill xmlns:a14="http://schemas.microsoft.com/office/drawing/2010/main">
+                <a:solidFill>
+                  <a:srgbClr val="FFFFFF"/>
+                </a:solidFill>
+              </a14:hiddenFill>
+            </a:ext>
+          </a:extLst>
+        </p:spPr>
+        <p:txBody>
+          <a:bodyPr vert="horz" wrap="square" lIns="91440" tIns="45720" rIns="91440" bIns="45720" numCol="1" anchor="t" anchorCtr="0" compatLnSpc="1">
+            <a:prstTxWarp prst="textNoShape">
+              <a:avLst/>
+            </a:prstTxWarp>
+          </a:bodyPr>
+          <a:lstStyle/>
+          <a:p>
+            <a:endParaRPr lang="en-US"/>
+          </a:p>
+        </p:txBody>
+      </p:sp>
+      <p:pic>
+        <p:nvPicPr>
+          <p:cNvPr id="1032" name="Picture 8" descr="http://albersfoundation.org/templates/assets/images/artists-biographies/biographies_01.jpg">
+            <a:hlinkClick r:id="rId3"/>
+          </p:cNvPr>
+          <p:cNvPicPr>
+            <a:picLocks noChangeAspect="1" noChangeArrowheads="1"/>
+          </p:cNvPicPr>
+          <p:nvPr/>
+        </p:nvPicPr>
+        <p:blipFill>
+          <a:blip r:embed="rId4" cstate="print">
+            <a:extLst>
+              <a:ext uri="{28A0092B-C50C-407E-A947-70E740481C1C}">
+                <a14:useLocalDpi xmlns:a14="http://schemas.microsoft.com/office/drawing/2010/main" val="0"/>
+              </a:ext>
+            </a:extLst>
+          </a:blip>
+          <a:srcRect/>
+          <a:stretch>
+            <a:fillRect/>
+          </a:stretch>
+        </p:blipFill>
+        <p:spPr bwMode="auto">
+          <a:xfrm>
+            <a:off x="6865445" y="2286000"/>
+            <a:ext cx="1752600" cy="2311315"/>
+          </a:xfrm>
+          <a:prstGeom prst="rect">
+            <a:avLst/>
+          </a:prstGeom>
+          <a:noFill/>
+          <a:extLst>
+            <a:ext uri="{909E8E84-426E-40DD-AFC4-6F175D3DCCD1}">
+              <a14:hiddenFill xmlns:a14="http://schemas.microsoft.com/office/drawing/2010/main">
+                <a:solidFill>
+                  <a:srgbClr val="FFFFFF"/>
+                </a:solidFill>
+              </a14:hiddenFill>
+            </a:ext>
+          </a:extLst>
+        </p:spPr>
+      </p:pic>
+      <p:sp>
+        <p:nvSpPr>
+          <p:cNvPr id="9" name="Rectangle 8"/>
+          <p:cNvSpPr/>
+          <p:nvPr/>
+        </p:nvSpPr>
+        <p:spPr>
+          <a:xfrm>
+            <a:off x="2590800" y="5105400"/>
+            <a:ext cx="5943601" cy="646331"/>
+          </a:xfrm>
+          <a:prstGeom prst="rect">
+            <a:avLst/>
+          </a:prstGeom>
+        </p:spPr>
+        <p:txBody>
+          <a:bodyPr wrap="square">
+            <a:spAutoFit/>
+          </a:bodyPr>
+          <a:lstStyle/>
+          <a:p>
+            <a:r>
+              <a:rPr lang="en-US" dirty="0" smtClean="0"/>
+              <a:t>instinctive</a:t>
+            </a:r>
+            <a:r>
+              <a:rPr lang="en-US" dirty="0"/>
+              <a:t>, acute and alert, brilliant businessmen, sophisticated in social interaction</a:t>
+            </a:r>
+          </a:p>
+        </p:txBody>
+      </p:sp>
+      <p:pic>
+        <p:nvPicPr>
+          <p:cNvPr id="10" name="Picture 9"/>
+          <p:cNvPicPr>
+            <a:picLocks noChangeAspect="1"/>
+          </p:cNvPicPr>
+          <p:nvPr/>
+        </p:nvPicPr>
+        <p:blipFill>
+          <a:blip r:embed="rId5">
+            <a:extLst>
+              <a:ext uri="{28A0092B-C50C-407E-A947-70E740481C1C}">
+                <a14:useLocalDpi xmlns:a14="http://schemas.microsoft.com/office/drawing/2010/main" val="0"/>
+              </a:ext>
+            </a:extLst>
+          </a:blip>
+          <a:stretch>
+            <a:fillRect/>
+          </a:stretch>
+        </p:blipFill>
+        <p:spPr>
+          <a:xfrm>
+            <a:off x="457200" y="2286000"/>
+            <a:ext cx="6408245" cy="2319338"/>
+          </a:xfrm>
+          <a:prstGeom prst="rect">
+            <a:avLst/>
+          </a:prstGeom>
+        </p:spPr>
+      </p:pic>
+    </p:spTree>
+    <p:extLst>
+      <p:ext uri="{BB962C8B-B14F-4D97-AF65-F5344CB8AC3E}">
+        <p14:creationId xmlns:p14="http://schemas.microsoft.com/office/powerpoint/2010/main" val="1435821388"/>
+      </p:ext>
+    </p:extLst>
+  </p:cSld>
+  <p:clrMapOvr>
+    <a:masterClrMapping/>
+  </p:clrMapOvr>
+  <p:timing>
+    <p:tnLst>
+      <p:par>
+        <p:cTn id="1" dur="indefinite" restart="never" nodeType="tmRoot"/>
+      </p:par>
+    </p:tnLst>
+  </p:timing>
+</p:sld>
+</file>
+
+<file path=ppt/slides/slide11.xml><?xml version="1.0" encoding="utf-8"?>
+<p:sld xmlns:a="http://schemas.openxmlformats.org/drawingml/2006/main" xmlns:r="http://schemas.openxmlformats.org/officeDocument/2006/relationships" xmlns:p="http://schemas.openxmlformats.org/presentationml/2006/main">
+  <p:cSld>
+    <p:spTree>
+      <p:nvGrpSpPr>
+        <p:cNvPr id="1" name=""/>
+        <p:cNvGrpSpPr/>
+        <p:nvPr/>
+      </p:nvGrpSpPr>
+      <p:grpSpPr>
+        <a:xfrm>
+          <a:off x="0" y="0"/>
+          <a:ext cx="0" cy="0"/>
+          <a:chOff x="0" y="0"/>
+          <a:chExt cx="0" cy="0"/>
+        </a:xfrm>
+      </p:grpSpPr>
+      <p:sp>
+        <p:nvSpPr>
+          <p:cNvPr id="2" name="Title 1"/>
+          <p:cNvSpPr>
+            <a:spLocks noGrp="1"/>
+          </p:cNvSpPr>
+          <p:nvPr>
+            <p:ph type="title"/>
+          </p:nvPr>
+        </p:nvSpPr>
+        <p:spPr/>
+        <p:txBody>
+          <a:bodyPr>
+            <a:normAutofit fontScale="90000"/>
+          </a:bodyPr>
+          <a:lstStyle/>
+          <a:p>
+            <a:r>
+              <a:rPr lang="en-US" dirty="0" smtClean="0"/>
+              <a:t>Top CMOA Year of the Ox </a:t>
+            </a:r>
+            <a:r>
+              <a:rPr lang="en-US" dirty="0"/>
+              <a:t>artist:</a:t>
+            </a:r>
+            <a:br>
+              <a:rPr lang="en-US" dirty="0"/>
+            </a:br>
+            <a:r>
+              <a:rPr lang="en-US" dirty="0"/>
+              <a:t>Walter Munhall </a:t>
+            </a:r>
+            <a:r>
+              <a:rPr lang="en-US" dirty="0" smtClean="0"/>
+              <a:t>(1901–1993)</a:t>
+            </a:r>
+            <a:endParaRPr lang="en-US" dirty="0"/>
+          </a:p>
+        </p:txBody>
+      </p:sp>
+      <p:sp>
+        <p:nvSpPr>
+          <p:cNvPr id="4" name="AutoShape 2" descr="Image result for Josef Albers"/>
+          <p:cNvSpPr>
+            <a:spLocks noChangeAspect="1" noChangeArrowheads="1"/>
+          </p:cNvSpPr>
+          <p:nvPr/>
+        </p:nvSpPr>
+        <p:spPr bwMode="auto">
+          <a:xfrm>
+            <a:off x="0" y="-144463"/>
+            <a:ext cx="304800" cy="304801"/>
+          </a:xfrm>
+          <a:prstGeom prst="rect">
+            <a:avLst/>
+          </a:prstGeom>
+          <a:noFill/>
+          <a:extLst>
+            <a:ext uri="{909E8E84-426E-40DD-AFC4-6F175D3DCCD1}">
+              <a14:hiddenFill xmlns:a14="http://schemas.microsoft.com/office/drawing/2010/main">
+                <a:solidFill>
+                  <a:srgbClr val="FFFFFF"/>
+                </a:solidFill>
+              </a14:hiddenFill>
+            </a:ext>
+          </a:extLst>
+        </p:spPr>
+        <p:txBody>
+          <a:bodyPr vert="horz" wrap="square" lIns="91440" tIns="45720" rIns="91440" bIns="45720" numCol="1" anchor="t" anchorCtr="0" compatLnSpc="1">
+            <a:prstTxWarp prst="textNoShape">
+              <a:avLst/>
+            </a:prstTxWarp>
+          </a:bodyPr>
+          <a:lstStyle/>
+          <a:p>
+            <a:endParaRPr lang="en-US"/>
+          </a:p>
+        </p:txBody>
+      </p:sp>
+      <p:pic>
+        <p:nvPicPr>
+          <p:cNvPr id="1034" name="Picture 10"/>
+          <p:cNvPicPr>
+            <a:picLocks noChangeAspect="1" noChangeArrowheads="1"/>
+          </p:cNvPicPr>
+          <p:nvPr/>
+        </p:nvPicPr>
+        <p:blipFill rotWithShape="1">
+          <a:blip r:embed="rId2">
+            <a:extLst>
+              <a:ext uri="{28A0092B-C50C-407E-A947-70E740481C1C}">
+                <a14:useLocalDpi xmlns:a14="http://schemas.microsoft.com/office/drawing/2010/main" val="0"/>
+              </a:ext>
+            </a:extLst>
+          </a:blip>
+          <a:srcRect l="20824" t="38542" r="33815" b="30729"/>
+          <a:stretch/>
+        </p:blipFill>
+        <p:spPr bwMode="auto">
+          <a:xfrm>
+            <a:off x="838200" y="2570450"/>
+            <a:ext cx="5902036" cy="2247900"/>
+          </a:xfrm>
+          <a:prstGeom prst="rect">
+            <a:avLst/>
+          </a:prstGeom>
+          <a:noFill/>
+          <a:ln>
+            <a:noFill/>
+          </a:ln>
+          <a:extLst>
+            <a:ext uri="{909E8E84-426E-40DD-AFC4-6F175D3DCCD1}">
+              <a14:hiddenFill xmlns:a14="http://schemas.microsoft.com/office/drawing/2010/main">
+                <a:solidFill>
+                  <a:schemeClr val="accent1"/>
+                </a:solidFill>
+              </a14:hiddenFill>
+            </a:ext>
+            <a:ext uri="{91240B29-F687-4F45-9708-019B960494DF}">
+              <a14:hiddenLine xmlns:a14="http://schemas.microsoft.com/office/drawing/2010/main" w="9525">
+                <a:solidFill>
+                  <a:schemeClr val="tx1"/>
+                </a:solidFill>
+                <a:miter lim="800000"/>
+                <a:headEnd/>
+                <a:tailEnd/>
+              </a14:hiddenLine>
+            </a:ext>
+          </a:extLst>
+        </p:spPr>
+      </p:pic>
+      <p:pic>
+        <p:nvPicPr>
+          <p:cNvPr id="2051" name="Picture 3" descr="http://www.cmoa.org/CollectionImage.aspx?irn=38704&amp;size=Large"/>
+          <p:cNvPicPr>
+            <a:picLocks noChangeAspect="1" noChangeArrowheads="1"/>
+          </p:cNvPicPr>
+          <p:nvPr/>
+        </p:nvPicPr>
+        <p:blipFill>
+          <a:blip r:embed="rId3">
+            <a:extLst>
+              <a:ext uri="{28A0092B-C50C-407E-A947-70E740481C1C}">
+                <a14:useLocalDpi xmlns:a14="http://schemas.microsoft.com/office/drawing/2010/main" val="0"/>
+              </a:ext>
+            </a:extLst>
+          </a:blip>
+          <a:srcRect/>
+          <a:stretch>
+            <a:fillRect/>
+          </a:stretch>
+        </p:blipFill>
+        <p:spPr bwMode="auto">
+          <a:xfrm>
+            <a:off x="1824037" y="2133600"/>
+            <a:ext cx="1533525" cy="2286001"/>
+          </a:xfrm>
+          <a:prstGeom prst="rect">
+            <a:avLst/>
+          </a:prstGeom>
+          <a:noFill/>
+          <a:extLst>
+            <a:ext uri="{909E8E84-426E-40DD-AFC4-6F175D3DCCD1}">
+              <a14:hiddenFill xmlns:a14="http://schemas.microsoft.com/office/drawing/2010/main">
+                <a:solidFill>
+                  <a:srgbClr val="FFFFFF"/>
+                </a:solidFill>
+              </a14:hiddenFill>
+            </a:ext>
+          </a:extLst>
+        </p:spPr>
+      </p:pic>
+      <p:sp>
+        <p:nvSpPr>
+          <p:cNvPr id="5" name="AutoShape 5" descr="Image result for Walter Munhall"/>
+          <p:cNvSpPr>
+            <a:spLocks noChangeAspect="1" noChangeArrowheads="1"/>
+          </p:cNvSpPr>
+          <p:nvPr/>
+        </p:nvSpPr>
+        <p:spPr bwMode="auto">
+          <a:xfrm>
+            <a:off x="152400" y="7937"/>
+            <a:ext cx="304800" cy="304801"/>
+          </a:xfrm>
+          <a:prstGeom prst="rect">
+            <a:avLst/>
+          </a:prstGeom>
+          <a:noFill/>
+          <a:extLst>
+            <a:ext uri="{909E8E84-426E-40DD-AFC4-6F175D3DCCD1}">
+              <a14:hiddenFill xmlns:a14="http://schemas.microsoft.com/office/drawing/2010/main">
+                <a:solidFill>
+                  <a:srgbClr val="FFFFFF"/>
+                </a:solidFill>
+              </a14:hiddenFill>
+            </a:ext>
+          </a:extLst>
+        </p:spPr>
+        <p:txBody>
+          <a:bodyPr vert="horz" wrap="square" lIns="91440" tIns="45720" rIns="91440" bIns="45720" numCol="1" anchor="t" anchorCtr="0" compatLnSpc="1">
+            <a:prstTxWarp prst="textNoShape">
+              <a:avLst/>
+            </a:prstTxWarp>
+          </a:bodyPr>
+          <a:lstStyle/>
+          <a:p>
+            <a:endParaRPr lang="en-US"/>
+          </a:p>
+        </p:txBody>
+      </p:sp>
+      <p:pic>
+        <p:nvPicPr>
+          <p:cNvPr id="2054" name="Picture 6"/>
+          <p:cNvPicPr>
+            <a:picLocks noChangeAspect="1" noChangeArrowheads="1"/>
+          </p:cNvPicPr>
+          <p:nvPr/>
+        </p:nvPicPr>
+        <p:blipFill>
+          <a:blip r:embed="rId4">
+            <a:extLst>
+              <a:ext uri="{28A0092B-C50C-407E-A947-70E740481C1C}">
+                <a14:useLocalDpi xmlns:a14="http://schemas.microsoft.com/office/drawing/2010/main" val="0"/>
+              </a:ext>
+            </a:extLst>
+          </a:blip>
+          <a:srcRect/>
+          <a:stretch>
+            <a:fillRect/>
+          </a:stretch>
+        </p:blipFill>
+        <p:spPr bwMode="auto">
+          <a:xfrm>
+            <a:off x="3657600" y="2133599"/>
+            <a:ext cx="3810002" cy="2286001"/>
+          </a:xfrm>
+          <a:prstGeom prst="rect">
+            <a:avLst/>
+          </a:prstGeom>
+          <a:noFill/>
+          <a:ln>
+            <a:noFill/>
+          </a:ln>
+          <a:extLst>
+            <a:ext uri="{909E8E84-426E-40DD-AFC4-6F175D3DCCD1}">
+              <a14:hiddenFill xmlns:a14="http://schemas.microsoft.com/office/drawing/2010/main">
+                <a:solidFill>
+                  <a:schemeClr val="accent1"/>
+                </a:solidFill>
+              </a14:hiddenFill>
+            </a:ext>
+            <a:ext uri="{91240B29-F687-4F45-9708-019B960494DF}">
+              <a14:hiddenLine xmlns:a14="http://schemas.microsoft.com/office/drawing/2010/main" w="9525">
+                <a:solidFill>
+                  <a:schemeClr val="tx1"/>
+                </a:solidFill>
+                <a:miter lim="800000"/>
+                <a:headEnd/>
+                <a:tailEnd/>
+              </a14:hiddenLine>
+            </a:ext>
+          </a:extLst>
+        </p:spPr>
+      </p:pic>
+      <p:sp>
+        <p:nvSpPr>
+          <p:cNvPr id="6" name="Rectangle 5"/>
+          <p:cNvSpPr/>
+          <p:nvPr/>
+        </p:nvSpPr>
+        <p:spPr>
+          <a:xfrm>
+            <a:off x="2209800" y="4800600"/>
+            <a:ext cx="5334000" cy="646331"/>
+          </a:xfrm>
+          <a:prstGeom prst="rect">
+            <a:avLst/>
+          </a:prstGeom>
+        </p:spPr>
+        <p:txBody>
+          <a:bodyPr wrap="square">
+            <a:spAutoFit/>
+          </a:bodyPr>
+          <a:lstStyle/>
+          <a:p>
+            <a:r>
+              <a:rPr lang="en-US" dirty="0"/>
+              <a:t>contemplative, simple, not easily affected by one's surroundings, honest to concept and ability</a:t>
+            </a:r>
+          </a:p>
+        </p:txBody>
+      </p:sp>
+    </p:spTree>
+    <p:extLst>
+      <p:ext uri="{BB962C8B-B14F-4D97-AF65-F5344CB8AC3E}">
+        <p14:creationId xmlns:p14="http://schemas.microsoft.com/office/powerpoint/2010/main" val="792499290"/>
+      </p:ext>
+    </p:extLst>
+  </p:cSld>
+  <p:clrMapOvr>
+    <a:masterClrMapping/>
+  </p:clrMapOvr>
+  <p:timing>
+    <p:tnLst>
+      <p:par>
+        <p:cTn id="1" dur="indefinite" restart="never" nodeType="tmRoot"/>
+      </p:par>
+    </p:tnLst>
+  </p:timing>
+</p:sld>
+</file>
+
+<file path=ppt/slides/slide12.xml><?xml version="1.0" encoding="utf-8"?>
+<p:sld xmlns:a="http://schemas.openxmlformats.org/drawingml/2006/main" xmlns:r="http://schemas.openxmlformats.org/officeDocument/2006/relationships" xmlns:p="http://schemas.openxmlformats.org/presentationml/2006/main">
+  <p:cSld>
+    <p:spTree>
+      <p:nvGrpSpPr>
+        <p:cNvPr id="1" name=""/>
+        <p:cNvGrpSpPr/>
+        <p:nvPr/>
+      </p:nvGrpSpPr>
+      <p:grpSpPr>
+        <a:xfrm>
+          <a:off x="0" y="0"/>
+          <a:ext cx="0" cy="0"/>
+          <a:chOff x="0" y="0"/>
+          <a:chExt cx="0" cy="0"/>
+        </a:xfrm>
+      </p:grpSpPr>
+      <p:sp>
+        <p:nvSpPr>
+          <p:cNvPr id="2" name="Title 1"/>
+          <p:cNvSpPr>
+            <a:spLocks noGrp="1"/>
+          </p:cNvSpPr>
+          <p:nvPr>
+            <p:ph type="title"/>
+          </p:nvPr>
+        </p:nvSpPr>
+        <p:spPr/>
+        <p:txBody>
+          <a:bodyPr>
+            <a:normAutofit fontScale="90000"/>
+          </a:bodyPr>
+          <a:lstStyle/>
+          <a:p>
+            <a:r>
+              <a:rPr lang="en-US" dirty="0" smtClean="0"/>
+              <a:t>Top CMOA Year of the Monkey </a:t>
+            </a:r>
+            <a:r>
+              <a:rPr lang="en-US" dirty="0"/>
+              <a:t>artist</a:t>
+            </a:r>
+            <a:r>
+              <a:rPr lang="en-US" dirty="0" smtClean="0"/>
+              <a:t>:</a:t>
+            </a:r>
+            <a:br>
+              <a:rPr lang="en-US" dirty="0" smtClean="0"/>
+            </a:br>
+            <a:r>
+              <a:rPr lang="en-US" dirty="0" smtClean="0"/>
+              <a:t>Duane </a:t>
+            </a:r>
+            <a:r>
+              <a:rPr lang="en-US" dirty="0" err="1" smtClean="0"/>
+              <a:t>Michals</a:t>
+            </a:r>
+            <a:r>
+              <a:rPr lang="en-US" dirty="0" smtClean="0"/>
+              <a:t> (1932)  </a:t>
+            </a:r>
+            <a:endParaRPr lang="en-US" dirty="0"/>
+          </a:p>
+        </p:txBody>
+      </p:sp>
+      <p:sp>
+        <p:nvSpPr>
+          <p:cNvPr id="4" name="AutoShape 2" descr="Image result for Josef Albers"/>
+          <p:cNvSpPr>
+            <a:spLocks noChangeAspect="1" noChangeArrowheads="1"/>
+          </p:cNvSpPr>
+          <p:nvPr/>
+        </p:nvSpPr>
+        <p:spPr bwMode="auto">
+          <a:xfrm>
+            <a:off x="0" y="-144463"/>
+            <a:ext cx="304800" cy="304801"/>
+          </a:xfrm>
+          <a:prstGeom prst="rect">
+            <a:avLst/>
+          </a:prstGeom>
+          <a:noFill/>
+          <a:extLst>
+            <a:ext uri="{909E8E84-426E-40DD-AFC4-6F175D3DCCD1}">
+              <a14:hiddenFill xmlns:a14="http://schemas.microsoft.com/office/drawing/2010/main">
+                <a:solidFill>
+                  <a:srgbClr val="FFFFFF"/>
+                </a:solidFill>
+              </a14:hiddenFill>
+            </a:ext>
+          </a:extLst>
+        </p:spPr>
+        <p:txBody>
+          <a:bodyPr vert="horz" wrap="square" lIns="91440" tIns="45720" rIns="91440" bIns="45720" numCol="1" anchor="t" anchorCtr="0" compatLnSpc="1">
+            <a:prstTxWarp prst="textNoShape">
+              <a:avLst/>
+            </a:prstTxWarp>
+          </a:bodyPr>
+          <a:lstStyle/>
+          <a:p>
+            <a:endParaRPr lang="en-US"/>
+          </a:p>
+        </p:txBody>
+      </p:sp>
+      <p:sp>
+        <p:nvSpPr>
+          <p:cNvPr id="5" name="AutoShape 5" descr="Image result for Walter Munhall"/>
+          <p:cNvSpPr>
+            <a:spLocks noChangeAspect="1" noChangeArrowheads="1"/>
+          </p:cNvSpPr>
+          <p:nvPr/>
+        </p:nvSpPr>
+        <p:spPr bwMode="auto">
+          <a:xfrm>
+            <a:off x="152400" y="7937"/>
+            <a:ext cx="304800" cy="304801"/>
+          </a:xfrm>
+          <a:prstGeom prst="rect">
+            <a:avLst/>
+          </a:prstGeom>
+          <a:noFill/>
+          <a:extLst>
+            <a:ext uri="{909E8E84-426E-40DD-AFC4-6F175D3DCCD1}">
+              <a14:hiddenFill xmlns:a14="http://schemas.microsoft.com/office/drawing/2010/main">
+                <a:solidFill>
+                  <a:srgbClr val="FFFFFF"/>
+                </a:solidFill>
+              </a14:hiddenFill>
+            </a:ext>
+          </a:extLst>
+        </p:spPr>
+        <p:txBody>
+          <a:bodyPr vert="horz" wrap="square" lIns="91440" tIns="45720" rIns="91440" bIns="45720" numCol="1" anchor="t" anchorCtr="0" compatLnSpc="1">
+            <a:prstTxWarp prst="textNoShape">
+              <a:avLst/>
+            </a:prstTxWarp>
+          </a:bodyPr>
+          <a:lstStyle/>
+          <a:p>
+            <a:endParaRPr lang="en-US"/>
+          </a:p>
+        </p:txBody>
+      </p:sp>
+      <p:sp>
+        <p:nvSpPr>
+          <p:cNvPr id="6" name="Rectangle 5"/>
+          <p:cNvSpPr/>
+          <p:nvPr/>
+        </p:nvSpPr>
+        <p:spPr>
+          <a:xfrm>
+            <a:off x="1143000" y="5995505"/>
+            <a:ext cx="7467600" cy="646331"/>
+          </a:xfrm>
+          <a:prstGeom prst="rect">
+            <a:avLst/>
+          </a:prstGeom>
+        </p:spPr>
+        <p:txBody>
+          <a:bodyPr wrap="square">
+            <a:spAutoFit/>
+          </a:bodyPr>
+          <a:lstStyle/>
+          <a:p>
+            <a:r>
+              <a:rPr lang="en-US" dirty="0" smtClean="0"/>
+              <a:t>Quick-witted </a:t>
+            </a:r>
+            <a:r>
+              <a:rPr lang="en-US" dirty="0"/>
+              <a:t>and versatile, innovative and lively. Has an impetuous temper and a slight tendency to look down upon others. </a:t>
+            </a:r>
+          </a:p>
+        </p:txBody>
+      </p:sp>
+      <p:sp>
+        <p:nvSpPr>
+          <p:cNvPr id="3" name="Rectangle 2"/>
+          <p:cNvSpPr/>
+          <p:nvPr/>
+        </p:nvSpPr>
+        <p:spPr>
+          <a:xfrm>
+            <a:off x="1713379" y="4714875"/>
+            <a:ext cx="5735171" cy="923330"/>
+          </a:xfrm>
+          <a:prstGeom prst="rect">
+            <a:avLst/>
+          </a:prstGeom>
+          <a:solidFill>
+            <a:schemeClr val="accent3"/>
+          </a:solidFill>
+        </p:spPr>
+        <p:txBody>
+          <a:bodyPr wrap="square">
+            <a:spAutoFit/>
+          </a:bodyPr>
+          <a:lstStyle/>
+          <a:p>
+            <a:r>
+              <a:rPr lang="en-US" dirty="0">
+                <a:solidFill>
+                  <a:schemeClr val="bg1"/>
+                </a:solidFill>
+              </a:rPr>
+              <a:t>“I don’t trust reality. So all of the writing on and painting on the photographs is born out of the frustration to express what you do not see.” –Duane </a:t>
+            </a:r>
+            <a:r>
+              <a:rPr lang="en-US" dirty="0" err="1">
+                <a:solidFill>
+                  <a:schemeClr val="bg1"/>
+                </a:solidFill>
+              </a:rPr>
+              <a:t>Michals</a:t>
+            </a:r>
+            <a:endParaRPr lang="en-US" dirty="0">
+              <a:solidFill>
+                <a:schemeClr val="bg1"/>
+              </a:solidFill>
+            </a:endParaRPr>
+          </a:p>
+        </p:txBody>
+      </p:sp>
+      <p:pic>
+        <p:nvPicPr>
+          <p:cNvPr id="9" name="Picture 8"/>
+          <p:cNvPicPr>
+            <a:picLocks noChangeAspect="1"/>
+          </p:cNvPicPr>
+          <p:nvPr/>
+        </p:nvPicPr>
+        <p:blipFill>
+          <a:blip r:embed="rId3">
+            <a:extLst>
+              <a:ext uri="{28A0092B-C50C-407E-A947-70E740481C1C}">
+                <a14:useLocalDpi xmlns:a14="http://schemas.microsoft.com/office/drawing/2010/main" val="0"/>
+              </a:ext>
+            </a:extLst>
+          </a:blip>
+          <a:stretch>
+            <a:fillRect/>
+          </a:stretch>
+        </p:blipFill>
+        <p:spPr>
+          <a:xfrm>
+            <a:off x="1695450" y="2143125"/>
+            <a:ext cx="5753100" cy="2571750"/>
+          </a:xfrm>
+          <a:prstGeom prst="rect">
+            <a:avLst/>
+          </a:prstGeom>
+        </p:spPr>
+      </p:pic>
+    </p:spTree>
+    <p:extLst>
+      <p:ext uri="{BB962C8B-B14F-4D97-AF65-F5344CB8AC3E}">
+        <p14:creationId xmlns:p14="http://schemas.microsoft.com/office/powerpoint/2010/main" val="2464326910"/>
+      </p:ext>
+    </p:extLst>
+  </p:cSld>
+  <p:clrMapOvr>
+    <a:masterClrMapping/>
+  </p:clrMapOvr>
+  <p:timing>
+    <p:tnLst>
+      <p:par>
+        <p:cTn id="1" dur="indefinite" restart="never" nodeType="tmRoot"/>
+      </p:par>
+    </p:tnLst>
+  </p:timing>
+</p:sld>
+</file>
+
+<file path=ppt/slides/slide13.xml><?xml version="1.0" encoding="utf-8"?>
+<p:sld xmlns:a="http://schemas.openxmlformats.org/drawingml/2006/main" xmlns:r="http://schemas.openxmlformats.org/officeDocument/2006/relationships" xmlns:p="http://schemas.openxmlformats.org/presentationml/2006/main">
+  <p:cSld>
+    <p:spTree>
+      <p:nvGrpSpPr>
+        <p:cNvPr id="1" name=""/>
+        <p:cNvGrpSpPr/>
+        <p:nvPr/>
+      </p:nvGrpSpPr>
+      <p:grpSpPr>
+        <a:xfrm>
+          <a:off x="0" y="0"/>
+          <a:ext cx="0" cy="0"/>
+          <a:chOff x="0" y="0"/>
+          <a:chExt cx="0" cy="0"/>
+        </a:xfrm>
+      </p:grpSpPr>
+      <p:sp>
+        <p:nvSpPr>
+          <p:cNvPr id="2" name="Title 1"/>
+          <p:cNvSpPr>
+            <a:spLocks noGrp="1"/>
+          </p:cNvSpPr>
+          <p:nvPr>
+            <p:ph type="title"/>
+          </p:nvPr>
+        </p:nvSpPr>
+        <p:spPr>
+          <a:xfrm>
+            <a:off x="420594" y="4724400"/>
+            <a:ext cx="8229600" cy="334962"/>
+          </a:xfrm>
+          <a:solidFill>
+            <a:schemeClr val="accent3"/>
+          </a:solidFill>
+        </p:spPr>
+        <p:txBody>
+          <a:bodyPr>
+            <a:noAutofit/>
+          </a:bodyPr>
+          <a:lstStyle/>
+          <a:p>
+            <a:r>
+              <a:rPr lang="en-US" sz="2000" i="1" dirty="0">
+                <a:solidFill>
+                  <a:schemeClr val="bg1"/>
+                </a:solidFill>
+              </a:rPr>
+              <a:t>Duane </a:t>
+            </a:r>
+            <a:r>
+              <a:rPr lang="en-US" sz="2000" i="1" dirty="0" err="1">
+                <a:solidFill>
+                  <a:schemeClr val="bg1"/>
+                </a:solidFill>
+              </a:rPr>
+              <a:t>Michals</a:t>
+            </a:r>
+            <a:r>
+              <a:rPr lang="en-US" sz="2000" i="1" dirty="0">
+                <a:solidFill>
+                  <a:schemeClr val="bg1"/>
+                </a:solidFill>
+              </a:rPr>
+              <a:t>, Grandpa Goes to Heaven</a:t>
+            </a:r>
+            <a:r>
+              <a:rPr lang="en-US" sz="2000" dirty="0">
+                <a:solidFill>
+                  <a:schemeClr val="bg1"/>
+                </a:solidFill>
+              </a:rPr>
+              <a:t>, 1989, The Henry L. Hillman Fund</a:t>
+            </a:r>
+          </a:p>
+        </p:txBody>
+      </p:sp>
+      <p:pic>
+        <p:nvPicPr>
+          <p:cNvPr id="5122" name="Picture 2" descr="alt"/>
+          <p:cNvPicPr>
+            <a:picLocks noChangeAspect="1" noChangeArrowheads="1"/>
+          </p:cNvPicPr>
+          <p:nvPr/>
+        </p:nvPicPr>
+        <p:blipFill>
+          <a:blip r:embed="rId2">
+            <a:extLst>
+              <a:ext uri="{28A0092B-C50C-407E-A947-70E740481C1C}">
+                <a14:useLocalDpi xmlns:a14="http://schemas.microsoft.com/office/drawing/2010/main" val="0"/>
+              </a:ext>
+            </a:extLst>
+          </a:blip>
+          <a:srcRect/>
+          <a:stretch>
+            <a:fillRect/>
+          </a:stretch>
+        </p:blipFill>
+        <p:spPr bwMode="auto">
+          <a:xfrm>
+            <a:off x="90394" y="2667000"/>
+            <a:ext cx="8890000" cy="1905000"/>
+          </a:xfrm>
+          <a:prstGeom prst="rect">
+            <a:avLst/>
+          </a:prstGeom>
+          <a:noFill/>
+          <a:extLst>
+            <a:ext uri="{909E8E84-426E-40DD-AFC4-6F175D3DCCD1}">
+              <a14:hiddenFill xmlns:a14="http://schemas.microsoft.com/office/drawing/2010/main">
+                <a:solidFill>
+                  <a:srgbClr val="FFFFFF"/>
+                </a:solidFill>
+              </a14:hiddenFill>
+            </a:ext>
+          </a:extLst>
+        </p:spPr>
+      </p:pic>
+    </p:spTree>
+    <p:extLst>
+      <p:ext uri="{BB962C8B-B14F-4D97-AF65-F5344CB8AC3E}">
+        <p14:creationId xmlns:p14="http://schemas.microsoft.com/office/powerpoint/2010/main" val="2272943533"/>
+      </p:ext>
+    </p:extLst>
+  </p:cSld>
+  <p:clrMapOvr>
+    <a:masterClrMapping/>
+  </p:clrMapOvr>
+</p:sld>
+</file>
+
+<file path=ppt/slides/slide14.xml><?xml version="1.0" encoding="utf-8"?>
+<p:sld xmlns:a="http://schemas.openxmlformats.org/drawingml/2006/main" xmlns:r="http://schemas.openxmlformats.org/officeDocument/2006/relationships" xmlns:p="http://schemas.openxmlformats.org/presentationml/2006/main">
+  <p:cSld>
+    <p:spTree>
+      <p:nvGrpSpPr>
+        <p:cNvPr id="1" name=""/>
+        <p:cNvGrpSpPr/>
+        <p:nvPr/>
+      </p:nvGrpSpPr>
+      <p:grpSpPr>
+        <a:xfrm>
+          <a:off x="0" y="0"/>
+          <a:ext cx="0" cy="0"/>
+          <a:chOff x="0" y="0"/>
+          <a:chExt cx="0" cy="0"/>
+        </a:xfrm>
+      </p:grpSpPr>
+      <p:sp>
+        <p:nvSpPr>
+          <p:cNvPr id="2" name="Title 1"/>
+          <p:cNvSpPr>
+            <a:spLocks noGrp="1"/>
+          </p:cNvSpPr>
+          <p:nvPr>
+            <p:ph type="title"/>
+          </p:nvPr>
+        </p:nvSpPr>
+        <p:spPr/>
+        <p:txBody>
+          <a:bodyPr>
+            <a:normAutofit fontScale="90000"/>
+          </a:bodyPr>
+          <a:lstStyle/>
+          <a:p>
+            <a:r>
+              <a:rPr lang="en-US" dirty="0" smtClean="0"/>
+              <a:t>Top CMOA Year of the Rooster </a:t>
+            </a:r>
+            <a:r>
+              <a:rPr lang="en-US" dirty="0"/>
+              <a:t>artist</a:t>
+            </a:r>
+            <a:r>
+              <a:rPr lang="en-US" dirty="0" smtClean="0"/>
+              <a:t>:</a:t>
+            </a:r>
+            <a:br>
+              <a:rPr lang="en-US" dirty="0" smtClean="0"/>
+            </a:br>
+            <a:r>
+              <a:rPr lang="en-US" dirty="0" smtClean="0"/>
+              <a:t>George Biddle  (1885-1973)  </a:t>
+            </a:r>
+            <a:endParaRPr lang="en-US" dirty="0"/>
+          </a:p>
+        </p:txBody>
+      </p:sp>
+      <p:sp>
+        <p:nvSpPr>
+          <p:cNvPr id="4" name="AutoShape 2" descr="Image result for Josef Albers"/>
+          <p:cNvSpPr>
+            <a:spLocks noChangeAspect="1" noChangeArrowheads="1"/>
+          </p:cNvSpPr>
+          <p:nvPr/>
+        </p:nvSpPr>
+        <p:spPr bwMode="auto">
+          <a:xfrm>
+            <a:off x="0" y="-144463"/>
+            <a:ext cx="304800" cy="304801"/>
+          </a:xfrm>
+          <a:prstGeom prst="rect">
+            <a:avLst/>
+          </a:prstGeom>
+          <a:noFill/>
+          <a:extLst>
+            <a:ext uri="{909E8E84-426E-40DD-AFC4-6F175D3DCCD1}">
+              <a14:hiddenFill xmlns:a14="http://schemas.microsoft.com/office/drawing/2010/main">
+                <a:solidFill>
+                  <a:srgbClr val="FFFFFF"/>
+                </a:solidFill>
+              </a14:hiddenFill>
+            </a:ext>
+          </a:extLst>
+        </p:spPr>
+        <p:txBody>
+          <a:bodyPr vert="horz" wrap="square" lIns="91440" tIns="45720" rIns="91440" bIns="45720" numCol="1" anchor="t" anchorCtr="0" compatLnSpc="1">
+            <a:prstTxWarp prst="textNoShape">
+              <a:avLst/>
+            </a:prstTxWarp>
+          </a:bodyPr>
+          <a:lstStyle/>
+          <a:p>
+            <a:endParaRPr lang="en-US"/>
+          </a:p>
+        </p:txBody>
+      </p:sp>
+      <p:sp>
+        <p:nvSpPr>
+          <p:cNvPr id="5" name="AutoShape 5" descr="Image result for Walter Munhall"/>
+          <p:cNvSpPr>
+            <a:spLocks noChangeAspect="1" noChangeArrowheads="1"/>
+          </p:cNvSpPr>
+          <p:nvPr/>
+        </p:nvSpPr>
+        <p:spPr bwMode="auto">
+          <a:xfrm>
+            <a:off x="152400" y="7937"/>
+            <a:ext cx="304800" cy="304801"/>
+          </a:xfrm>
+          <a:prstGeom prst="rect">
+            <a:avLst/>
+          </a:prstGeom>
+          <a:noFill/>
+          <a:extLst>
+            <a:ext uri="{909E8E84-426E-40DD-AFC4-6F175D3DCCD1}">
+              <a14:hiddenFill xmlns:a14="http://schemas.microsoft.com/office/drawing/2010/main">
+                <a:solidFill>
+                  <a:srgbClr val="FFFFFF"/>
+                </a:solidFill>
+              </a14:hiddenFill>
+            </a:ext>
+          </a:extLst>
+        </p:spPr>
+        <p:txBody>
+          <a:bodyPr vert="horz" wrap="square" lIns="91440" tIns="45720" rIns="91440" bIns="45720" numCol="1" anchor="t" anchorCtr="0" compatLnSpc="1">
+            <a:prstTxWarp prst="textNoShape">
+              <a:avLst/>
+            </a:prstTxWarp>
+          </a:bodyPr>
+          <a:lstStyle/>
+          <a:p>
+            <a:endParaRPr lang="en-US"/>
+          </a:p>
+        </p:txBody>
+      </p:sp>
+      <p:sp>
+        <p:nvSpPr>
+          <p:cNvPr id="6" name="Rectangle 5"/>
+          <p:cNvSpPr/>
+          <p:nvPr/>
+        </p:nvSpPr>
+        <p:spPr>
+          <a:xfrm>
+            <a:off x="1143000" y="5995505"/>
+            <a:ext cx="7467600" cy="646331"/>
+          </a:xfrm>
+          <a:prstGeom prst="rect">
+            <a:avLst/>
+          </a:prstGeom>
+        </p:spPr>
+        <p:txBody>
+          <a:bodyPr wrap="square">
+            <a:spAutoFit/>
+          </a:bodyPr>
+          <a:lstStyle/>
+          <a:p>
+            <a:r>
+              <a:rPr lang="en-US" dirty="0"/>
+              <a:t>bright, communicative and ambitious. Good looking and prefer to dress up. Often starts out enthusiastic, but need persistence to complete projects. </a:t>
+            </a:r>
+          </a:p>
+        </p:txBody>
+      </p:sp>
+      <p:sp>
+        <p:nvSpPr>
+          <p:cNvPr id="7" name="AutoShape 2" descr="Image result for george biddle artist"/>
+          <p:cNvSpPr>
+            <a:spLocks noChangeAspect="1" noChangeArrowheads="1"/>
+          </p:cNvSpPr>
+          <p:nvPr/>
+        </p:nvSpPr>
+        <p:spPr bwMode="auto">
+          <a:xfrm>
+            <a:off x="304800" y="160337"/>
+            <a:ext cx="304800" cy="304801"/>
+          </a:xfrm>
+          <a:prstGeom prst="rect">
+            <a:avLst/>
+          </a:prstGeom>
+          <a:noFill/>
+          <a:extLst>
+            <a:ext uri="{909E8E84-426E-40DD-AFC4-6F175D3DCCD1}">
+              <a14:hiddenFill xmlns:a14="http://schemas.microsoft.com/office/drawing/2010/main">
+                <a:solidFill>
+                  <a:srgbClr val="FFFFFF"/>
+                </a:solidFill>
+              </a14:hiddenFill>
+            </a:ext>
+          </a:extLst>
+        </p:spPr>
+        <p:txBody>
+          <a:bodyPr vert="horz" wrap="square" lIns="91440" tIns="45720" rIns="91440" bIns="45720" numCol="1" anchor="t" anchorCtr="0" compatLnSpc="1">
+            <a:prstTxWarp prst="textNoShape">
+              <a:avLst/>
+            </a:prstTxWarp>
+          </a:bodyPr>
+          <a:lstStyle/>
+          <a:p>
+            <a:endParaRPr lang="en-US"/>
+          </a:p>
+        </p:txBody>
+      </p:sp>
+      <p:pic>
+        <p:nvPicPr>
+          <p:cNvPr id="4099" name="Picture 3"/>
+          <p:cNvPicPr>
+            <a:picLocks noChangeAspect="1" noChangeArrowheads="1"/>
+          </p:cNvPicPr>
+          <p:nvPr/>
+        </p:nvPicPr>
+        <p:blipFill>
+          <a:blip r:embed="rId3">
+            <a:extLst>
+              <a:ext uri="{28A0092B-C50C-407E-A947-70E740481C1C}">
+                <a14:useLocalDpi xmlns:a14="http://schemas.microsoft.com/office/drawing/2010/main" val="0"/>
+              </a:ext>
+            </a:extLst>
+          </a:blip>
+          <a:srcRect/>
+          <a:stretch>
+            <a:fillRect/>
+          </a:stretch>
+        </p:blipFill>
+        <p:spPr bwMode="auto">
+          <a:xfrm>
+            <a:off x="5029200" y="1524000"/>
+            <a:ext cx="3307954" cy="4337470"/>
+          </a:xfrm>
+          <a:prstGeom prst="rect">
+            <a:avLst/>
+          </a:prstGeom>
+          <a:noFill/>
+          <a:ln>
+            <a:noFill/>
+          </a:ln>
+          <a:extLst>
+            <a:ext uri="{909E8E84-426E-40DD-AFC4-6F175D3DCCD1}">
+              <a14:hiddenFill xmlns:a14="http://schemas.microsoft.com/office/drawing/2010/main">
+                <a:solidFill>
+                  <a:schemeClr val="accent1"/>
+                </a:solidFill>
+              </a14:hiddenFill>
+            </a:ext>
+            <a:ext uri="{91240B29-F687-4F45-9708-019B960494DF}">
+              <a14:hiddenLine xmlns:a14="http://schemas.microsoft.com/office/drawing/2010/main" w="9525">
+                <a:solidFill>
+                  <a:schemeClr val="tx1"/>
+                </a:solidFill>
+                <a:miter lim="800000"/>
+                <a:headEnd/>
+                <a:tailEnd/>
+              </a14:hiddenLine>
+            </a:ext>
+          </a:extLst>
+        </p:spPr>
+      </p:pic>
+      <p:pic>
+        <p:nvPicPr>
+          <p:cNvPr id="4102" name="Picture 6" descr="https://s-media-cache-ak0.pinimg.com/236x/91/5d/ff/915dff9ce9dd78ba7fdb81b34cd702e3.jpg">
+            <a:hlinkClick r:id="rId4"/>
+          </p:cNvPr>
+          <p:cNvPicPr>
+            <a:picLocks noChangeAspect="1" noChangeArrowheads="1"/>
+          </p:cNvPicPr>
+          <p:nvPr/>
+        </p:nvPicPr>
+        <p:blipFill>
+          <a:blip r:embed="rId5">
+            <a:extLst>
+              <a:ext uri="{28A0092B-C50C-407E-A947-70E740481C1C}">
+                <a14:useLocalDpi xmlns:a14="http://schemas.microsoft.com/office/drawing/2010/main" val="0"/>
+              </a:ext>
+            </a:extLst>
+          </a:blip>
+          <a:srcRect/>
+          <a:stretch>
+            <a:fillRect/>
+          </a:stretch>
+        </p:blipFill>
+        <p:spPr bwMode="auto">
+          <a:xfrm>
+            <a:off x="609600" y="2549735"/>
+            <a:ext cx="4056358" cy="2286000"/>
+          </a:xfrm>
+          <a:prstGeom prst="rect">
+            <a:avLst/>
+          </a:prstGeom>
+          <a:noFill/>
+          <a:extLst>
+            <a:ext uri="{909E8E84-426E-40DD-AFC4-6F175D3DCCD1}">
+              <a14:hiddenFill xmlns:a14="http://schemas.microsoft.com/office/drawing/2010/main">
+                <a:solidFill>
+                  <a:srgbClr val="FFFFFF"/>
+                </a:solidFill>
+              </a14:hiddenFill>
+            </a:ext>
+          </a:extLst>
+        </p:spPr>
+      </p:pic>
+    </p:spTree>
+    <p:extLst>
+      <p:ext uri="{BB962C8B-B14F-4D97-AF65-F5344CB8AC3E}">
+        <p14:creationId xmlns:p14="http://schemas.microsoft.com/office/powerpoint/2010/main" val="3450256465"/>
+      </p:ext>
+    </p:extLst>
+  </p:cSld>
+  <p:clrMapOvr>
+    <a:masterClrMapping/>
+  </p:clrMapOvr>
+  <p:timing>
+    <p:tnLst>
+      <p:par>
+        <p:cTn id="1" dur="indefinite" restart="never" nodeType="tmRoot"/>
+      </p:par>
+    </p:tnLst>
+  </p:timing>
+</p:sld>
+</file>
+
 <file path=ppt/slides/slide2.xml><?xml version="1.0" encoding="utf-8"?>
 <p:sld xmlns:a="http://schemas.openxmlformats.org/drawingml/2006/main" xmlns:r="http://schemas.openxmlformats.org/officeDocument/2006/relationships" xmlns:p="http://schemas.openxmlformats.org/presentationml/2006/main">
   <p:cSld>
@@ -5721,6 +7847,13 @@
   <p:clrMapOvr>
     <a:masterClrMapping/>
   </p:clrMapOvr>
+  <p:timing>
+    <p:tnLst>
+      <p:par>
+        <p:cTn id="1" dur="indefinite" restart="never" nodeType="tmRoot"/>
+      </p:par>
+    </p:tnLst>
+  </p:timing>
 </p:sld>
 </file>
 
@@ -6007,4 +8140,289 @@
   <a:objectDefaults/>
   <a:extraClrSchemeLst/>
 </a:theme>
+</file>
+
+<file path=ppt/theme/theme2.xml><?xml version="1.0" encoding="utf-8"?>
+<a:theme xmlns:a="http://schemas.openxmlformats.org/drawingml/2006/main" name="Office Theme">
+  <a:themeElements>
+    <a:clrScheme name="Office">
+      <a:dk1>
+        <a:sysClr val="windowText" lastClr="000000"/>
+      </a:dk1>
+      <a:lt1>
+        <a:sysClr val="window" lastClr="FFFFFF"/>
+      </a:lt1>
+      <a:dk2>
+        <a:srgbClr val="1F497D"/>
+      </a:dk2>
+      <a:lt2>
+        <a:srgbClr val="EEECE1"/>
+      </a:lt2>
+      <a:accent1>
+        <a:srgbClr val="4F81BD"/>
+      </a:accent1>
+      <a:accent2>
+        <a:srgbClr val="C0504D"/>
+      </a:accent2>
+      <a:accent3>
+        <a:srgbClr val="9BBB59"/>
+      </a:accent3>
+      <a:accent4>
+        <a:srgbClr val="8064A2"/>
+      </a:accent4>
+      <a:accent5>
+        <a:srgbClr val="4BACC6"/>
+      </a:accent5>
+      <a:accent6>
+        <a:srgbClr val="F79646"/>
+      </a:accent6>
+      <a:hlink>
+        <a:srgbClr val="0000FF"/>
+      </a:hlink>
+      <a:folHlink>
+        <a:srgbClr val="800080"/>
+      </a:folHlink>
+    </a:clrScheme>
+    <a:fontScheme name="Office">
+      <a:majorFont>
+        <a:latin typeface="Calibri"/>
+        <a:ea typeface=""/>
+        <a:cs typeface=""/>
+        <a:font script="Jpan" typeface="ＭＳ Ｐゴシック"/>
+        <a:font script="Hang" typeface="맑은 고딕"/>
+        <a:font script="Hans" typeface="宋体"/>
+        <a:font script="Hant" typeface="新細明體"/>
+        <a:font script="Arab" typeface="Times New Roman"/>
+        <a:font script="Hebr" typeface="Times New Roman"/>
+        <a:font script="Thai" typeface="Angsana New"/>
+        <a:font script="Ethi" typeface="Nyala"/>
+        <a:font script="Beng" typeface="Vrinda"/>
+        <a:font script="Gujr" typeface="Shruti"/>
+        <a:font script="Khmr" typeface="MoolBoran"/>
+        <a:font script="Knda" typeface="Tunga"/>
+        <a:font script="Guru" typeface="Raavi"/>
+        <a:font script="Cans" typeface="Euphemia"/>
+        <a:font script="Cher" typeface="Plantagenet Cherokee"/>
+        <a:font script="Yiii" typeface="Microsoft Yi Baiti"/>
+        <a:font script="Tibt" typeface="Microsoft Himalaya"/>
+        <a:font script="Thaa" typeface="MV Boli"/>
+        <a:font script="Deva" typeface="Mangal"/>
+        <a:font script="Telu" typeface="Gautami"/>
+        <a:font script="Taml" typeface="Latha"/>
+        <a:font script="Syrc" typeface="Estrangelo Edessa"/>
+        <a:font script="Orya" typeface="Kalinga"/>
+        <a:font script="Mlym" typeface="Kartika"/>
+        <a:font script="Laoo" typeface="DokChampa"/>
+        <a:font script="Sinh" typeface="Iskoola Pota"/>
+        <a:font script="Mong" typeface="Mongolian Baiti"/>
+        <a:font script="Viet" typeface="Times New Roman"/>
+        <a:font script="Uigh" typeface="Microsoft Uighur"/>
+        <a:font script="Geor" typeface="Sylfaen"/>
+      </a:majorFont>
+      <a:minorFont>
+        <a:latin typeface="Calibri"/>
+        <a:ea typeface=""/>
+        <a:cs typeface=""/>
+        <a:font script="Jpan" typeface="ＭＳ Ｐゴシック"/>
+        <a:font script="Hang" typeface="맑은 고딕"/>
+        <a:font script="Hans" typeface="宋体"/>
+        <a:font script="Hant" typeface="新細明體"/>
+        <a:font script="Arab" typeface="Arial"/>
+        <a:font script="Hebr" typeface="Arial"/>
+        <a:font script="Thai" typeface="Cordia New"/>
+        <a:font script="Ethi" typeface="Nyala"/>
+        <a:font script="Beng" typeface="Vrinda"/>
+        <a:font script="Gujr" typeface="Shruti"/>
+        <a:font script="Khmr" typeface="DaunPenh"/>
+        <a:font script="Knda" typeface="Tunga"/>
+        <a:font script="Guru" typeface="Raavi"/>
+        <a:font script="Cans" typeface="Euphemia"/>
+        <a:font script="Cher" typeface="Plantagenet Cherokee"/>
+        <a:font script="Yiii" typeface="Microsoft Yi Baiti"/>
+        <a:font script="Tibt" typeface="Microsoft Himalaya"/>
+        <a:font script="Thaa" typeface="MV Boli"/>
+        <a:font script="Deva" typeface="Mangal"/>
+        <a:font script="Telu" typeface="Gautami"/>
+        <a:font script="Taml" typeface="Latha"/>
+        <a:font script="Syrc" typeface="Estrangelo Edessa"/>
+        <a:font script="Orya" typeface="Kalinga"/>
+        <a:font script="Mlym" typeface="Kartika"/>
+        <a:font script="Laoo" typeface="DokChampa"/>
+        <a:font script="Sinh" typeface="Iskoola Pota"/>
+        <a:font script="Mong" typeface="Mongolian Baiti"/>
+        <a:font script="Viet" typeface="Arial"/>
+        <a:font script="Uigh" typeface="Microsoft Uighur"/>
+        <a:font script="Geor" typeface="Sylfaen"/>
+      </a:minorFont>
+    </a:fontScheme>
+    <a:fmtScheme name="Office">
+      <a:fillStyleLst>
+        <a:solidFill>
+          <a:schemeClr val="phClr"/>
+        </a:solidFill>
+        <a:gradFill rotWithShape="1">
+          <a:gsLst>
+            <a:gs pos="0">
+              <a:schemeClr val="phClr">
+                <a:tint val="50000"/>
+                <a:satMod val="300000"/>
+              </a:schemeClr>
+            </a:gs>
+            <a:gs pos="35000">
+              <a:schemeClr val="phClr">
+                <a:tint val="37000"/>
+                <a:satMod val="300000"/>
+              </a:schemeClr>
+            </a:gs>
+            <a:gs pos="100000">
+              <a:schemeClr val="phClr">
+                <a:tint val="15000"/>
+                <a:satMod val="350000"/>
+              </a:schemeClr>
+            </a:gs>
+          </a:gsLst>
+          <a:lin ang="16200000" scaled="1"/>
+        </a:gradFill>
+        <a:gradFill rotWithShape="1">
+          <a:gsLst>
+            <a:gs pos="0">
+              <a:schemeClr val="phClr">
+                <a:shade val="51000"/>
+                <a:satMod val="130000"/>
+              </a:schemeClr>
+            </a:gs>
+            <a:gs pos="80000">
+              <a:schemeClr val="phClr">
+                <a:shade val="93000"/>
+                <a:satMod val="130000"/>
+              </a:schemeClr>
+            </a:gs>
+            <a:gs pos="100000">
+              <a:schemeClr val="phClr">
+                <a:shade val="94000"/>
+                <a:satMod val="135000"/>
+              </a:schemeClr>
+            </a:gs>
+          </a:gsLst>
+          <a:lin ang="16200000" scaled="0"/>
+        </a:gradFill>
+      </a:fillStyleLst>
+      <a:lnStyleLst>
+        <a:ln w="9525" cap="flat" cmpd="sng" algn="ctr">
+          <a:solidFill>
+            <a:schemeClr val="phClr">
+              <a:shade val="95000"/>
+              <a:satMod val="105000"/>
+            </a:schemeClr>
+          </a:solidFill>
+          <a:prstDash val="solid"/>
+        </a:ln>
+        <a:ln w="25400" cap="flat" cmpd="sng" algn="ctr">
+          <a:solidFill>
+            <a:schemeClr val="phClr"/>
+          </a:solidFill>
+          <a:prstDash val="solid"/>
+        </a:ln>
+        <a:ln w="38100" cap="flat" cmpd="sng" algn="ctr">
+          <a:solidFill>
+            <a:schemeClr val="phClr"/>
+          </a:solidFill>
+          <a:prstDash val="solid"/>
+        </a:ln>
+      </a:lnStyleLst>
+      <a:effectStyleLst>
+        <a:effectStyle>
+          <a:effectLst>
+            <a:outerShdw blurRad="40000" dist="20000" dir="5400000" rotWithShape="0">
+              <a:srgbClr val="000000">
+                <a:alpha val="38000"/>
+              </a:srgbClr>
+            </a:outerShdw>
+          </a:effectLst>
+        </a:effectStyle>
+        <a:effectStyle>
+          <a:effectLst>
+            <a:outerShdw blurRad="40000" dist="23000" dir="5400000" rotWithShape="0">
+              <a:srgbClr val="000000">
+                <a:alpha val="35000"/>
+              </a:srgbClr>
+            </a:outerShdw>
+          </a:effectLst>
+        </a:effectStyle>
+        <a:effectStyle>
+          <a:effectLst>
+            <a:outerShdw blurRad="40000" dist="23000" dir="5400000" rotWithShape="0">
+              <a:srgbClr val="000000">
+                <a:alpha val="35000"/>
+              </a:srgbClr>
+            </a:outerShdw>
+          </a:effectLst>
+          <a:scene3d>
+            <a:camera prst="orthographicFront">
+              <a:rot lat="0" lon="0" rev="0"/>
+            </a:camera>
+            <a:lightRig rig="threePt" dir="t">
+              <a:rot lat="0" lon="0" rev="1200000"/>
+            </a:lightRig>
+          </a:scene3d>
+          <a:sp3d>
+            <a:bevelT w="63500" h="25400"/>
+          </a:sp3d>
+        </a:effectStyle>
+      </a:effectStyleLst>
+      <a:bgFillStyleLst>
+        <a:solidFill>
+          <a:schemeClr val="phClr"/>
+        </a:solidFill>
+        <a:gradFill rotWithShape="1">
+          <a:gsLst>
+            <a:gs pos="0">
+              <a:schemeClr val="phClr">
+                <a:tint val="40000"/>
+                <a:satMod val="350000"/>
+              </a:schemeClr>
+            </a:gs>
+            <a:gs pos="40000">
+              <a:schemeClr val="phClr">
+                <a:tint val="45000"/>
+                <a:shade val="99000"/>
+                <a:satMod val="350000"/>
+              </a:schemeClr>
+            </a:gs>
+            <a:gs pos="100000">
+              <a:schemeClr val="phClr">
+                <a:shade val="20000"/>
+                <a:satMod val="255000"/>
+              </a:schemeClr>
+            </a:gs>
+          </a:gsLst>
+          <a:path path="circle">
+            <a:fillToRect l="50000" t="-80000" r="50000" b="180000"/>
+          </a:path>
+        </a:gradFill>
+        <a:gradFill rotWithShape="1">
+          <a:gsLst>
+            <a:gs pos="0">
+              <a:schemeClr val="phClr">
+                <a:tint val="80000"/>
+                <a:satMod val="300000"/>
+              </a:schemeClr>
+            </a:gs>
+            <a:gs pos="100000">
+              <a:schemeClr val="phClr">
+                <a:shade val="30000"/>
+                <a:satMod val="200000"/>
+              </a:schemeClr>
+            </a:gs>
+          </a:gsLst>
+          <a:path path="circle">
+            <a:fillToRect l="50000" t="50000" r="50000" b="50000"/>
+          </a:path>
+        </a:gradFill>
+      </a:bgFillStyleLst>
+    </a:fmtScheme>
+  </a:themeElements>
+  <a:objectDefaults/>
+  <a:extraClrSchemeLst/>
+</a:theme>
 </file>
</xml_diff>